<commit_message>
# Updated 7545 - Carpeta Final.docx and PresentacionTecnica.pptx
</commit_message>
<xml_diff>
--- a/Assets/PresentacionTecnica.pptx
+++ b/Assets/PresentacionTecnica.pptx
@@ -5,25 +5,27 @@
     <p:sldMasterId id="2147483870" r:id="rId1"/>
   </p:sldMasterIdLst>
   <p:notesMasterIdLst>
-    <p:notesMasterId r:id="rId18"/>
+    <p:notesMasterId r:id="rId20"/>
   </p:notesMasterIdLst>
   <p:sldIdLst>
     <p:sldId id="256" r:id="rId2"/>
     <p:sldId id="268" r:id="rId3"/>
     <p:sldId id="257" r:id="rId4"/>
     <p:sldId id="258" r:id="rId5"/>
-    <p:sldId id="269" r:id="rId6"/>
-    <p:sldId id="259" r:id="rId7"/>
-    <p:sldId id="262" r:id="rId8"/>
-    <p:sldId id="267" r:id="rId9"/>
-    <p:sldId id="266" r:id="rId10"/>
-    <p:sldId id="260" r:id="rId11"/>
-    <p:sldId id="261" r:id="rId12"/>
-    <p:sldId id="263" r:id="rId13"/>
-    <p:sldId id="265" r:id="rId14"/>
-    <p:sldId id="264" r:id="rId15"/>
-    <p:sldId id="271" r:id="rId16"/>
-    <p:sldId id="272" r:id="rId17"/>
+    <p:sldId id="274" r:id="rId6"/>
+    <p:sldId id="269" r:id="rId7"/>
+    <p:sldId id="259" r:id="rId8"/>
+    <p:sldId id="273" r:id="rId9"/>
+    <p:sldId id="262" r:id="rId10"/>
+    <p:sldId id="267" r:id="rId11"/>
+    <p:sldId id="266" r:id="rId12"/>
+    <p:sldId id="260" r:id="rId13"/>
+    <p:sldId id="263" r:id="rId14"/>
+    <p:sldId id="265" r:id="rId15"/>
+    <p:sldId id="261" r:id="rId16"/>
+    <p:sldId id="264" r:id="rId17"/>
+    <p:sldId id="271" r:id="rId18"/>
+    <p:sldId id="272" r:id="rId19"/>
   </p:sldIdLst>
   <p:sldSz cx="12192000" cy="6858000"/>
   <p:notesSz cx="6858000" cy="9144000"/>
@@ -851,7 +853,7 @@
           <a:p>
             <a:fld id="{9204D49E-1F23-4BD5-B9E9-C7C6DEB063CD}" type="slidenum">
               <a:rPr lang="es-AR" smtClean="0"/>
-              <a:t>6</a:t>
+              <a:t>5</a:t>
             </a:fld>
             <a:endParaRPr lang="es-AR"/>
           </a:p>
@@ -860,7 +862,7 @@
     </p:spTree>
     <p:extLst>
       <p:ext uri="{BB962C8B-B14F-4D97-AF65-F5344CB8AC3E}">
-        <p14:creationId xmlns:p14="http://schemas.microsoft.com/office/powerpoint/2010/main" val="1785299462"/>
+        <p14:creationId xmlns:p14="http://schemas.microsoft.com/office/powerpoint/2010/main" val="218875394"/>
       </p:ext>
     </p:extLst>
   </p:cSld>
@@ -914,158 +916,6 @@
           <a:bodyPr/>
           <a:lstStyle/>
           <a:p>
-            <a:r>
-              <a:rPr lang="en-US" dirty="0" err="1" smtClean="0"/>
-              <a:t>Es</a:t>
-            </a:r>
-            <a:r>
-              <a:rPr lang="en-US" baseline="0" dirty="0" smtClean="0"/>
-              <a:t> </a:t>
-            </a:r>
-            <a:r>
-              <a:rPr lang="en-US" baseline="0" dirty="0" err="1" smtClean="0"/>
-              <a:t>importante</a:t>
-            </a:r>
-            <a:r>
-              <a:rPr lang="en-US" baseline="0" dirty="0" smtClean="0"/>
-              <a:t> lo de no </a:t>
-            </a:r>
-            <a:r>
-              <a:rPr lang="en-US" baseline="0" dirty="0" err="1" smtClean="0"/>
-              <a:t>necesitar</a:t>
-            </a:r>
-            <a:r>
-              <a:rPr lang="en-US" baseline="0" dirty="0" smtClean="0"/>
-              <a:t> personal de IT </a:t>
-            </a:r>
-            <a:r>
-              <a:rPr lang="en-US" baseline="0" dirty="0" err="1" smtClean="0"/>
-              <a:t>dedicado</a:t>
-            </a:r>
-            <a:r>
-              <a:rPr lang="en-US" baseline="0" dirty="0" smtClean="0"/>
-              <a:t> </a:t>
-            </a:r>
-            <a:r>
-              <a:rPr lang="en-US" baseline="0" dirty="0" err="1" smtClean="0"/>
-              <a:t>asi</a:t>
-            </a:r>
-            <a:r>
-              <a:rPr lang="en-US" baseline="0" dirty="0" smtClean="0"/>
-              <a:t> </a:t>
-            </a:r>
-            <a:r>
-              <a:rPr lang="en-US" baseline="0" dirty="0" err="1" smtClean="0"/>
-              <a:t>nos</a:t>
-            </a:r>
-            <a:r>
-              <a:rPr lang="en-US" baseline="0" dirty="0" smtClean="0"/>
-              <a:t> </a:t>
-            </a:r>
-            <a:r>
-              <a:rPr lang="en-US" baseline="0" dirty="0" err="1" smtClean="0"/>
-              <a:t>podemos</a:t>
-            </a:r>
-            <a:r>
-              <a:rPr lang="en-US" baseline="0" dirty="0" smtClean="0"/>
-              <a:t> </a:t>
-            </a:r>
-            <a:r>
-              <a:rPr lang="en-US" baseline="0" dirty="0" err="1" smtClean="0"/>
-              <a:t>dedicar</a:t>
-            </a:r>
-            <a:r>
-              <a:rPr lang="en-US" baseline="0" dirty="0" smtClean="0"/>
-              <a:t> a </a:t>
-            </a:r>
-            <a:r>
-              <a:rPr lang="en-US" baseline="0" dirty="0" err="1" smtClean="0"/>
-              <a:t>nuestro</a:t>
-            </a:r>
-            <a:r>
-              <a:rPr lang="en-US" baseline="0" dirty="0" smtClean="0"/>
-              <a:t> core business. </a:t>
-            </a:r>
-            <a:r>
-              <a:rPr lang="en-US" baseline="0" dirty="0" err="1" smtClean="0"/>
-              <a:t>Eventualmente</a:t>
-            </a:r>
-            <a:r>
-              <a:rPr lang="en-US" baseline="0" dirty="0" smtClean="0"/>
-              <a:t>, </a:t>
-            </a:r>
-            <a:r>
-              <a:rPr lang="en-US" baseline="0" dirty="0" err="1" smtClean="0"/>
-              <a:t>vamos</a:t>
-            </a:r>
-            <a:r>
-              <a:rPr lang="en-US" baseline="0" dirty="0" smtClean="0"/>
-              <a:t> a </a:t>
-            </a:r>
-            <a:r>
-              <a:rPr lang="en-US" baseline="0" dirty="0" err="1" smtClean="0"/>
-              <a:t>necesitar</a:t>
-            </a:r>
-            <a:r>
-              <a:rPr lang="en-US" baseline="0" dirty="0" smtClean="0"/>
-              <a:t> </a:t>
-            </a:r>
-            <a:r>
-              <a:rPr lang="en-US" baseline="0" dirty="0" err="1" smtClean="0"/>
-              <a:t>gente</a:t>
-            </a:r>
-            <a:r>
-              <a:rPr lang="en-US" baseline="0" dirty="0" smtClean="0"/>
-              <a:t> con </a:t>
-            </a:r>
-            <a:r>
-              <a:rPr lang="en-US" baseline="0" dirty="0" err="1" smtClean="0"/>
-              <a:t>dedicación</a:t>
-            </a:r>
-            <a:r>
-              <a:rPr lang="en-US" baseline="0" dirty="0" smtClean="0"/>
-              <a:t> </a:t>
-            </a:r>
-            <a:r>
-              <a:rPr lang="en-US" baseline="0" dirty="0" err="1" smtClean="0"/>
-              <a:t>exclusiva</a:t>
-            </a:r>
-            <a:r>
-              <a:rPr lang="en-US" baseline="0" dirty="0" smtClean="0"/>
-              <a:t> para </a:t>
-            </a:r>
-            <a:r>
-              <a:rPr lang="en-US" baseline="0" dirty="0" err="1" smtClean="0"/>
-              <a:t>tener</a:t>
-            </a:r>
-            <a:r>
-              <a:rPr lang="en-US" baseline="0" dirty="0" smtClean="0"/>
-              <a:t> mayor control </a:t>
-            </a:r>
-            <a:r>
-              <a:rPr lang="en-US" baseline="0" dirty="0" err="1" smtClean="0"/>
-              <a:t>sobre</a:t>
-            </a:r>
-            <a:r>
-              <a:rPr lang="en-US" baseline="0" dirty="0" smtClean="0"/>
-              <a:t> los </a:t>
-            </a:r>
-            <a:r>
-              <a:rPr lang="en-US" baseline="0" dirty="0" err="1" smtClean="0"/>
-              <a:t>costos</a:t>
-            </a:r>
-            <a:r>
-              <a:rPr lang="en-US" baseline="0" dirty="0" smtClean="0"/>
-              <a:t> y la </a:t>
-            </a:r>
-            <a:r>
-              <a:rPr lang="en-US" baseline="0" dirty="0" err="1" smtClean="0"/>
-              <a:t>infraestructura</a:t>
-            </a:r>
-            <a:r>
-              <a:rPr lang="en-US" baseline="0" dirty="0" smtClean="0"/>
-              <a:t>.</a:t>
-            </a:r>
             <a:endParaRPr lang="es-AR" dirty="0"/>
           </a:p>
         </p:txBody>
@@ -1096,7 +946,7 @@
     </p:spTree>
     <p:extLst>
       <p:ext uri="{BB962C8B-B14F-4D97-AF65-F5344CB8AC3E}">
-        <p14:creationId xmlns:p14="http://schemas.microsoft.com/office/powerpoint/2010/main" val="2971761272"/>
+        <p14:creationId xmlns:p14="http://schemas.microsoft.com/office/powerpoint/2010/main" val="1785299462"/>
       </p:ext>
     </p:extLst>
   </p:cSld>
@@ -1151,20 +1001,8 @@
           <a:lstStyle/>
           <a:p>
             <a:r>
-              <a:rPr lang="en-US" dirty="0" smtClean="0"/>
-              <a:t>Son </a:t>
-            </a:r>
-            <a:r>
               <a:rPr lang="en-US" dirty="0" err="1" smtClean="0"/>
-              <a:t>cosas</a:t>
-            </a:r>
-            <a:r>
-              <a:rPr lang="en-US" dirty="0" smtClean="0"/>
-              <a:t> en </a:t>
-            </a:r>
-            <a:r>
-              <a:rPr lang="en-US" dirty="0" err="1" smtClean="0"/>
-              <a:t>las</a:t>
+              <a:t>Es</a:t>
             </a:r>
             <a:r>
               <a:rPr lang="en-US" baseline="0" dirty="0" smtClean="0"/>
@@ -1172,7 +1010,23 @@
             </a:r>
             <a:r>
               <a:rPr lang="en-US" baseline="0" dirty="0" err="1" smtClean="0"/>
-              <a:t>que</a:t>
+              <a:t>importante</a:t>
+            </a:r>
+            <a:r>
+              <a:rPr lang="en-US" baseline="0" dirty="0" smtClean="0"/>
+              <a:t> lo de no </a:t>
+            </a:r>
+            <a:r>
+              <a:rPr lang="en-US" baseline="0" dirty="0" err="1" smtClean="0"/>
+              <a:t>necesitar</a:t>
+            </a:r>
+            <a:r>
+              <a:rPr lang="en-US" baseline="0" dirty="0" smtClean="0"/>
+              <a:t> personal de IT </a:t>
+            </a:r>
+            <a:r>
+              <a:rPr lang="en-US" baseline="0" dirty="0" err="1" smtClean="0"/>
+              <a:t>dedicado</a:t>
             </a:r>
             <a:r>
               <a:rPr lang="en-US" baseline="0" dirty="0" smtClean="0"/>
@@ -1180,7 +1034,7 @@
             </a:r>
             <a:r>
               <a:rPr lang="en-US" baseline="0" dirty="0" err="1" smtClean="0"/>
-              <a:t>ya</a:t>
+              <a:t>asi</a:t>
             </a:r>
             <a:r>
               <a:rPr lang="en-US" baseline="0" dirty="0" smtClean="0"/>
@@ -1188,7 +1042,23 @@
             </a:r>
             <a:r>
               <a:rPr lang="en-US" baseline="0" dirty="0" err="1" smtClean="0"/>
-              <a:t>empezamos</a:t>
+              <a:t>nos</a:t>
+            </a:r>
+            <a:r>
+              <a:rPr lang="en-US" baseline="0" dirty="0" smtClean="0"/>
+              <a:t> </a:t>
+            </a:r>
+            <a:r>
+              <a:rPr lang="en-US" baseline="0" dirty="0" err="1" smtClean="0"/>
+              <a:t>podemos</a:t>
+            </a:r>
+            <a:r>
+              <a:rPr lang="en-US" baseline="0" dirty="0" smtClean="0"/>
+              <a:t> </a:t>
+            </a:r>
+            <a:r>
+              <a:rPr lang="en-US" baseline="0" dirty="0" err="1" smtClean="0"/>
+              <a:t>dedicar</a:t>
             </a:r>
             <a:r>
               <a:rPr lang="en-US" baseline="0" dirty="0" smtClean="0"/>
@@ -1196,23 +1066,31 @@
             </a:r>
             <a:r>
               <a:rPr lang="en-US" baseline="0" dirty="0" err="1" smtClean="0"/>
-              <a:t>trabajar</a:t>
+              <a:t>nuestro</a:t>
             </a:r>
             <a:r>
               <a:rPr lang="en-US" baseline="0" dirty="0" smtClean="0"/>
-              <a:t> con vista a la gran </a:t>
+              <a:t> core business. </a:t>
             </a:r>
             <a:r>
               <a:rPr lang="en-US" baseline="0" dirty="0" err="1" smtClean="0"/>
-              <a:t>cantidad</a:t>
+              <a:t>Eventualmente</a:t>
             </a:r>
             <a:r>
               <a:rPr lang="en-US" baseline="0" dirty="0" smtClean="0"/>
-              <a:t> de </a:t>
+              <a:t>, </a:t>
             </a:r>
             <a:r>
               <a:rPr lang="en-US" baseline="0" dirty="0" err="1" smtClean="0"/>
-              <a:t>usuarios</a:t>
+              <a:t>vamos</a:t>
+            </a:r>
+            <a:r>
+              <a:rPr lang="en-US" baseline="0" dirty="0" smtClean="0"/>
+              <a:t> a </a:t>
+            </a:r>
+            <a:r>
+              <a:rPr lang="en-US" baseline="0" dirty="0" err="1" smtClean="0"/>
+              <a:t>necesitar</a:t>
             </a:r>
             <a:r>
               <a:rPr lang="en-US" baseline="0" dirty="0" smtClean="0"/>
@@ -1220,7 +1098,15 @@
             </a:r>
             <a:r>
               <a:rPr lang="en-US" baseline="0" dirty="0" err="1" smtClean="0"/>
-              <a:t>que</a:t>
+              <a:t>gente</a:t>
+            </a:r>
+            <a:r>
+              <a:rPr lang="en-US" baseline="0" dirty="0" smtClean="0"/>
+              <a:t> con </a:t>
+            </a:r>
+            <a:r>
+              <a:rPr lang="en-US" baseline="0" dirty="0" err="1" smtClean="0"/>
+              <a:t>dedicación</a:t>
             </a:r>
             <a:r>
               <a:rPr lang="en-US" baseline="0" dirty="0" smtClean="0"/>
@@ -1228,23 +1114,39 @@
             </a:r>
             <a:r>
               <a:rPr lang="en-US" baseline="0" dirty="0" err="1" smtClean="0"/>
-              <a:t>va</a:t>
+              <a:t>exclusiva</a:t>
             </a:r>
             <a:r>
               <a:rPr lang="en-US" baseline="0" dirty="0" smtClean="0"/>
-              <a:t> a </a:t>
+              <a:t> para </a:t>
             </a:r>
             <a:r>
               <a:rPr lang="en-US" baseline="0" dirty="0" err="1" smtClean="0"/>
-              <a:t>usar</a:t>
+              <a:t>tener</a:t>
             </a:r>
             <a:r>
               <a:rPr lang="en-US" baseline="0" dirty="0" smtClean="0"/>
-              <a:t> la </a:t>
+              <a:t> mayor control </a:t>
             </a:r>
             <a:r>
               <a:rPr lang="en-US" baseline="0" dirty="0" err="1" smtClean="0"/>
-              <a:t>aplicación</a:t>
+              <a:t>sobre</a:t>
+            </a:r>
+            <a:r>
+              <a:rPr lang="en-US" baseline="0" dirty="0" smtClean="0"/>
+              <a:t> los </a:t>
+            </a:r>
+            <a:r>
+              <a:rPr lang="en-US" baseline="0" dirty="0" err="1" smtClean="0"/>
+              <a:t>costos</a:t>
+            </a:r>
+            <a:r>
+              <a:rPr lang="en-US" baseline="0" dirty="0" smtClean="0"/>
+              <a:t> y la </a:t>
+            </a:r>
+            <a:r>
+              <a:rPr lang="en-US" baseline="0" dirty="0" err="1" smtClean="0"/>
+              <a:t>infraestructura</a:t>
             </a:r>
             <a:r>
               <a:rPr lang="en-US" baseline="0" dirty="0" smtClean="0"/>
@@ -1280,7 +1182,7 @@
     </p:spTree>
     <p:extLst>
       <p:ext uri="{BB962C8B-B14F-4D97-AF65-F5344CB8AC3E}">
-        <p14:creationId xmlns:p14="http://schemas.microsoft.com/office/powerpoint/2010/main" val="2135334208"/>
+        <p14:creationId xmlns:p14="http://schemas.microsoft.com/office/powerpoint/2010/main" val="2971761272"/>
       </p:ext>
     </p:extLst>
   </p:cSld>
@@ -1335,32 +1237,20 @@
           <a:lstStyle/>
           <a:p>
             <a:r>
+              <a:rPr lang="en-US" dirty="0" smtClean="0"/>
+              <a:t>Son </a:t>
+            </a:r>
+            <a:r>
               <a:rPr lang="en-US" dirty="0" err="1" smtClean="0"/>
-              <a:t>Oauth</a:t>
+              <a:t>cosas</a:t>
             </a:r>
             <a:r>
               <a:rPr lang="en-US" dirty="0" smtClean="0"/>
-              <a:t> </a:t>
+              <a:t> en </a:t>
             </a:r>
             <a:r>
               <a:rPr lang="en-US" dirty="0" err="1" smtClean="0"/>
-              <a:t>permitira</a:t>
-            </a:r>
-            <a:r>
-              <a:rPr lang="en-US" dirty="0" smtClean="0"/>
-              <a:t> </a:t>
-            </a:r>
-            <a:r>
-              <a:rPr lang="en-US" dirty="0" err="1" smtClean="0"/>
-              <a:t>integración</a:t>
-            </a:r>
-            <a:r>
-              <a:rPr lang="en-US" dirty="0" smtClean="0"/>
-              <a:t> con </a:t>
-            </a:r>
-            <a:r>
-              <a:rPr lang="en-US" dirty="0" err="1" smtClean="0"/>
-              <a:t>otras</a:t>
+              <a:t>las</a:t>
             </a:r>
             <a:r>
               <a:rPr lang="en-US" baseline="0" dirty="0" smtClean="0"/>
@@ -1368,7 +1258,7 @@
             </a:r>
             <a:r>
               <a:rPr lang="en-US" baseline="0" dirty="0" err="1" smtClean="0"/>
-              <a:t>aplicaciones</a:t>
+              <a:t>que</a:t>
             </a:r>
             <a:r>
               <a:rPr lang="en-US" baseline="0" dirty="0" smtClean="0"/>
@@ -1376,7 +1266,7 @@
             </a:r>
             <a:r>
               <a:rPr lang="en-US" baseline="0" dirty="0" err="1" smtClean="0"/>
-              <a:t>que</a:t>
+              <a:t>ya</a:t>
             </a:r>
             <a:r>
               <a:rPr lang="en-US" baseline="0" dirty="0" smtClean="0"/>
@@ -1384,15 +1274,63 @@
             </a:r>
             <a:r>
               <a:rPr lang="en-US" baseline="0" dirty="0" err="1" smtClean="0"/>
-              <a:t>puedan</a:t>
+              <a:t>empezamos</a:t>
             </a:r>
             <a:r>
               <a:rPr lang="en-US" baseline="0" dirty="0" smtClean="0"/>
-              <a:t> consumer los </a:t>
+              <a:t> a </a:t>
             </a:r>
             <a:r>
               <a:rPr lang="en-US" baseline="0" dirty="0" err="1" smtClean="0"/>
-              <a:t>datos</a:t>
+              <a:t>trabajar</a:t>
+            </a:r>
+            <a:r>
+              <a:rPr lang="en-US" baseline="0" dirty="0" smtClean="0"/>
+              <a:t> con vista a la gran </a:t>
+            </a:r>
+            <a:r>
+              <a:rPr lang="en-US" baseline="0" dirty="0" err="1" smtClean="0"/>
+              <a:t>cantidad</a:t>
+            </a:r>
+            <a:r>
+              <a:rPr lang="en-US" baseline="0" dirty="0" smtClean="0"/>
+              <a:t> de </a:t>
+            </a:r>
+            <a:r>
+              <a:rPr lang="en-US" baseline="0" dirty="0" err="1" smtClean="0"/>
+              <a:t>usuarios</a:t>
+            </a:r>
+            <a:r>
+              <a:rPr lang="en-US" baseline="0" dirty="0" smtClean="0"/>
+              <a:t> </a:t>
+            </a:r>
+            <a:r>
+              <a:rPr lang="en-US" baseline="0" dirty="0" err="1" smtClean="0"/>
+              <a:t>que</a:t>
+            </a:r>
+            <a:r>
+              <a:rPr lang="en-US" baseline="0" dirty="0" smtClean="0"/>
+              <a:t> </a:t>
+            </a:r>
+            <a:r>
+              <a:rPr lang="en-US" baseline="0" dirty="0" err="1" smtClean="0"/>
+              <a:t>va</a:t>
+            </a:r>
+            <a:r>
+              <a:rPr lang="en-US" baseline="0" dirty="0" smtClean="0"/>
+              <a:t> a </a:t>
+            </a:r>
+            <a:r>
+              <a:rPr lang="en-US" baseline="0" dirty="0" err="1" smtClean="0"/>
+              <a:t>usar</a:t>
+            </a:r>
+            <a:r>
+              <a:rPr lang="en-US" baseline="0" dirty="0" smtClean="0"/>
+              <a:t> la </a:t>
+            </a:r>
+            <a:r>
+              <a:rPr lang="en-US" baseline="0" dirty="0" err="1" smtClean="0"/>
+              <a:t>aplicación</a:t>
             </a:r>
             <a:r>
               <a:rPr lang="en-US" baseline="0" dirty="0" smtClean="0"/>
@@ -1428,7 +1366,7 @@
     </p:spTree>
     <p:extLst>
       <p:ext uri="{BB962C8B-B14F-4D97-AF65-F5344CB8AC3E}">
-        <p14:creationId xmlns:p14="http://schemas.microsoft.com/office/powerpoint/2010/main" val="2073641703"/>
+        <p14:creationId xmlns:p14="http://schemas.microsoft.com/office/powerpoint/2010/main" val="2135334208"/>
       </p:ext>
     </p:extLst>
   </p:cSld>
@@ -1503,7 +1441,7 @@
           <a:p>
             <a:fld id="{9204D49E-1F23-4BD5-B9E9-C7C6DEB063CD}" type="slidenum">
               <a:rPr lang="es-AR" smtClean="0"/>
-              <a:t>12</a:t>
+              <a:t>13</a:t>
             </a:fld>
             <a:endParaRPr lang="es-AR"/>
           </a:p>
@@ -1513,6 +1451,154 @@
     <p:extLst>
       <p:ext uri="{BB962C8B-B14F-4D97-AF65-F5344CB8AC3E}">
         <p14:creationId xmlns:p14="http://schemas.microsoft.com/office/powerpoint/2010/main" val="3259600917"/>
+      </p:ext>
+    </p:extLst>
+  </p:cSld>
+  <p:clrMapOvr>
+    <a:masterClrMapping/>
+  </p:clrMapOvr>
+</p:notes>
+</file>
+
+<file path=ppt/notesSlides/notesSlide8.xml><?xml version="1.0" encoding="utf-8"?>
+<p:notes xmlns:a="http://schemas.openxmlformats.org/drawingml/2006/main" xmlns:r="http://schemas.openxmlformats.org/officeDocument/2006/relationships" xmlns:p="http://schemas.openxmlformats.org/presentationml/2006/main">
+  <p:cSld>
+    <p:spTree>
+      <p:nvGrpSpPr>
+        <p:cNvPr id="1" name=""/>
+        <p:cNvGrpSpPr/>
+        <p:nvPr/>
+      </p:nvGrpSpPr>
+      <p:grpSpPr>
+        <a:xfrm>
+          <a:off x="0" y="0"/>
+          <a:ext cx="0" cy="0"/>
+          <a:chOff x="0" y="0"/>
+          <a:chExt cx="0" cy="0"/>
+        </a:xfrm>
+      </p:grpSpPr>
+      <p:sp>
+        <p:nvSpPr>
+          <p:cNvPr id="2" name="Slide Image Placeholder 1"/>
+          <p:cNvSpPr>
+            <a:spLocks noGrp="1" noRot="1" noChangeAspect="1"/>
+          </p:cNvSpPr>
+          <p:nvPr>
+            <p:ph type="sldImg"/>
+          </p:nvPr>
+        </p:nvSpPr>
+        <p:spPr/>
+      </p:sp>
+      <p:sp>
+        <p:nvSpPr>
+          <p:cNvPr id="3" name="Notes Placeholder 2"/>
+          <p:cNvSpPr>
+            <a:spLocks noGrp="1"/>
+          </p:cNvSpPr>
+          <p:nvPr>
+            <p:ph type="body" idx="1"/>
+          </p:nvPr>
+        </p:nvSpPr>
+        <p:spPr/>
+        <p:txBody>
+          <a:bodyPr/>
+          <a:lstStyle/>
+          <a:p>
+            <a:r>
+              <a:rPr lang="en-US" dirty="0" err="1" smtClean="0"/>
+              <a:t>Oauth</a:t>
+            </a:r>
+            <a:r>
+              <a:rPr lang="en-US" dirty="0" smtClean="0"/>
+              <a:t> </a:t>
+            </a:r>
+            <a:r>
+              <a:rPr lang="en-US" dirty="0" err="1" smtClean="0"/>
+              <a:t>permitira</a:t>
+            </a:r>
+            <a:r>
+              <a:rPr lang="en-US" dirty="0" smtClean="0"/>
+              <a:t> </a:t>
+            </a:r>
+            <a:r>
+              <a:rPr lang="en-US" dirty="0" err="1" smtClean="0"/>
+              <a:t>integración</a:t>
+            </a:r>
+            <a:r>
+              <a:rPr lang="en-US" dirty="0" smtClean="0"/>
+              <a:t> con </a:t>
+            </a:r>
+            <a:r>
+              <a:rPr lang="en-US" dirty="0" err="1" smtClean="0"/>
+              <a:t>otras</a:t>
+            </a:r>
+            <a:r>
+              <a:rPr lang="en-US" baseline="0" dirty="0" smtClean="0"/>
+              <a:t> </a:t>
+            </a:r>
+            <a:r>
+              <a:rPr lang="en-US" baseline="0" dirty="0" err="1" smtClean="0"/>
+              <a:t>aplicaciones</a:t>
+            </a:r>
+            <a:r>
+              <a:rPr lang="en-US" baseline="0" dirty="0" smtClean="0"/>
+              <a:t> </a:t>
+            </a:r>
+            <a:r>
+              <a:rPr lang="en-US" baseline="0" dirty="0" err="1" smtClean="0"/>
+              <a:t>que</a:t>
+            </a:r>
+            <a:r>
+              <a:rPr lang="en-US" baseline="0" dirty="0" smtClean="0"/>
+              <a:t> </a:t>
+            </a:r>
+            <a:r>
+              <a:rPr lang="en-US" baseline="0" dirty="0" err="1" smtClean="0"/>
+              <a:t>puedan</a:t>
+            </a:r>
+            <a:r>
+              <a:rPr lang="en-US" baseline="0" dirty="0" smtClean="0"/>
+              <a:t> consumer los </a:t>
+            </a:r>
+            <a:r>
+              <a:rPr lang="en-US" baseline="0" dirty="0" err="1" smtClean="0"/>
+              <a:t>datos</a:t>
+            </a:r>
+            <a:r>
+              <a:rPr lang="en-US" baseline="0" dirty="0" smtClean="0"/>
+              <a:t>.</a:t>
+            </a:r>
+            <a:endParaRPr lang="es-AR" dirty="0"/>
+          </a:p>
+        </p:txBody>
+      </p:sp>
+      <p:sp>
+        <p:nvSpPr>
+          <p:cNvPr id="4" name="Slide Number Placeholder 3"/>
+          <p:cNvSpPr>
+            <a:spLocks noGrp="1"/>
+          </p:cNvSpPr>
+          <p:nvPr>
+            <p:ph type="sldNum" sz="quarter" idx="10"/>
+          </p:nvPr>
+        </p:nvSpPr>
+        <p:spPr/>
+        <p:txBody>
+          <a:bodyPr/>
+          <a:lstStyle/>
+          <a:p>
+            <a:fld id="{9204D49E-1F23-4BD5-B9E9-C7C6DEB063CD}" type="slidenum">
+              <a:rPr lang="es-AR" smtClean="0"/>
+              <a:t>15</a:t>
+            </a:fld>
+            <a:endParaRPr lang="es-AR"/>
+          </a:p>
+        </p:txBody>
+      </p:sp>
+    </p:spTree>
+    <p:extLst>
+      <p:ext uri="{BB962C8B-B14F-4D97-AF65-F5344CB8AC3E}">
+        <p14:creationId xmlns:p14="http://schemas.microsoft.com/office/powerpoint/2010/main" val="2073641703"/>
       </p:ext>
     </p:extLst>
   </p:cSld>
@@ -4899,6 +4985,336 @@
 </file>
 
 <file path=ppt/slides/slide10.xml><?xml version="1.0" encoding="utf-8"?>
+<p:sld xmlns:a="http://schemas.openxmlformats.org/drawingml/2006/main" xmlns:r="http://schemas.openxmlformats.org/officeDocument/2006/relationships" xmlns:p="http://schemas.openxmlformats.org/presentationml/2006/main">
+  <p:cSld>
+    <p:spTree>
+      <p:nvGrpSpPr>
+        <p:cNvPr id="1" name=""/>
+        <p:cNvGrpSpPr/>
+        <p:nvPr/>
+      </p:nvGrpSpPr>
+      <p:grpSpPr>
+        <a:xfrm>
+          <a:off x="0" y="0"/>
+          <a:ext cx="0" cy="0"/>
+          <a:chOff x="0" y="0"/>
+          <a:chExt cx="0" cy="0"/>
+        </a:xfrm>
+      </p:grpSpPr>
+      <p:sp>
+        <p:nvSpPr>
+          <p:cNvPr id="2" name="Title 1"/>
+          <p:cNvSpPr>
+            <a:spLocks noGrp="1"/>
+          </p:cNvSpPr>
+          <p:nvPr>
+            <p:ph type="title"/>
+          </p:nvPr>
+        </p:nvSpPr>
+        <p:spPr/>
+        <p:txBody>
+          <a:bodyPr/>
+          <a:lstStyle/>
+          <a:p>
+            <a:r>
+              <a:rPr lang="en-US" dirty="0" err="1" smtClean="0"/>
+              <a:t>Beneficios</a:t>
+            </a:r>
+            <a:r>
+              <a:rPr lang="en-US" dirty="0" smtClean="0"/>
+              <a:t> API REST</a:t>
+            </a:r>
+            <a:endParaRPr lang="es-AR" dirty="0"/>
+          </a:p>
+        </p:txBody>
+      </p:sp>
+      <p:sp>
+        <p:nvSpPr>
+          <p:cNvPr id="3" name="Content Placeholder 2"/>
+          <p:cNvSpPr>
+            <a:spLocks noGrp="1"/>
+          </p:cNvSpPr>
+          <p:nvPr>
+            <p:ph idx="1"/>
+          </p:nvPr>
+        </p:nvSpPr>
+        <p:spPr/>
+        <p:txBody>
+          <a:bodyPr>
+            <a:normAutofit/>
+          </a:bodyPr>
+          <a:lstStyle/>
+          <a:p>
+            <a:r>
+              <a:rPr lang="en-US" sz="2800" dirty="0" err="1" smtClean="0"/>
+              <a:t>Uniforme</a:t>
+            </a:r>
+            <a:r>
+              <a:rPr lang="en-US" sz="2800" dirty="0" smtClean="0"/>
+              <a:t> para </a:t>
+            </a:r>
+            <a:r>
+              <a:rPr lang="en-US" sz="2800" dirty="0" err="1" smtClean="0"/>
+              <a:t>todos</a:t>
+            </a:r>
+            <a:r>
+              <a:rPr lang="en-US" sz="2800" dirty="0" smtClean="0"/>
+              <a:t> los </a:t>
+            </a:r>
+            <a:r>
+              <a:rPr lang="en-US" sz="2800" dirty="0" err="1" smtClean="0"/>
+              <a:t>clientes</a:t>
+            </a:r>
+            <a:endParaRPr lang="en-US" sz="2800" dirty="0" smtClean="0"/>
+          </a:p>
+          <a:p>
+            <a:r>
+              <a:rPr lang="en-US" sz="2800" dirty="0" err="1" smtClean="0"/>
+              <a:t>Clientes</a:t>
+            </a:r>
+            <a:r>
+              <a:rPr lang="en-US" sz="2800" dirty="0" smtClean="0"/>
+              <a:t> solo </a:t>
+            </a:r>
+            <a:r>
+              <a:rPr lang="en-US" sz="2800" dirty="0" err="1"/>
+              <a:t>necesitan</a:t>
+            </a:r>
+            <a:r>
+              <a:rPr lang="en-US" sz="2800" dirty="0"/>
+              <a:t> </a:t>
+            </a:r>
+            <a:r>
+              <a:rPr lang="en-US" sz="2800" dirty="0" err="1"/>
+              <a:t>poder</a:t>
+            </a:r>
+            <a:r>
+              <a:rPr lang="en-US" sz="2800" dirty="0"/>
+              <a:t> </a:t>
+            </a:r>
+            <a:r>
+              <a:rPr lang="en-US" sz="2800" dirty="0" err="1"/>
+              <a:t>consumir</a:t>
+            </a:r>
+            <a:r>
+              <a:rPr lang="en-US" sz="2800" dirty="0"/>
+              <a:t> </a:t>
+            </a:r>
+            <a:r>
+              <a:rPr lang="en-US" sz="2800" dirty="0" smtClean="0"/>
+              <a:t>HTTP</a:t>
+            </a:r>
+          </a:p>
+          <a:p>
+            <a:r>
+              <a:rPr lang="en-US" sz="2800" dirty="0" err="1" smtClean="0"/>
+              <a:t>Abstrae</a:t>
+            </a:r>
+            <a:r>
+              <a:rPr lang="en-US" sz="2800" dirty="0" smtClean="0"/>
+              <a:t> la </a:t>
+            </a:r>
+            <a:r>
+              <a:rPr lang="en-US" sz="2800" dirty="0" err="1" smtClean="0"/>
+              <a:t>plataforma</a:t>
+            </a:r>
+            <a:r>
+              <a:rPr lang="en-US" sz="2800" dirty="0" smtClean="0"/>
+              <a:t> del </a:t>
+            </a:r>
+            <a:r>
+              <a:rPr lang="en-US" sz="2800" dirty="0" err="1" smtClean="0"/>
+              <a:t>servidor</a:t>
+            </a:r>
+            <a:endParaRPr lang="en-US" sz="2800" dirty="0" smtClean="0"/>
+          </a:p>
+          <a:p>
+            <a:r>
+              <a:rPr lang="en-US" sz="2800" dirty="0" smtClean="0"/>
+              <a:t>Caching HTTP</a:t>
+            </a:r>
+          </a:p>
+        </p:txBody>
+      </p:sp>
+    </p:spTree>
+    <p:extLst>
+      <p:ext uri="{BB962C8B-B14F-4D97-AF65-F5344CB8AC3E}">
+        <p14:creationId xmlns:p14="http://schemas.microsoft.com/office/powerpoint/2010/main" val="1930479364"/>
+      </p:ext>
+    </p:extLst>
+  </p:cSld>
+  <p:clrMapOvr>
+    <a:masterClrMapping/>
+  </p:clrMapOvr>
+  <p:timing>
+    <p:tnLst>
+      <p:par>
+        <p:cTn id="1" dur="indefinite" restart="never" nodeType="tmRoot"/>
+      </p:par>
+    </p:tnLst>
+  </p:timing>
+</p:sld>
+</file>
+
+<file path=ppt/slides/slide11.xml><?xml version="1.0" encoding="utf-8"?>
+<p:sld xmlns:a="http://schemas.openxmlformats.org/drawingml/2006/main" xmlns:r="http://schemas.openxmlformats.org/officeDocument/2006/relationships" xmlns:p="http://schemas.openxmlformats.org/presentationml/2006/main">
+  <p:cSld>
+    <p:spTree>
+      <p:nvGrpSpPr>
+        <p:cNvPr id="1" name=""/>
+        <p:cNvGrpSpPr/>
+        <p:nvPr/>
+      </p:nvGrpSpPr>
+      <p:grpSpPr>
+        <a:xfrm>
+          <a:off x="0" y="0"/>
+          <a:ext cx="0" cy="0"/>
+          <a:chOff x="0" y="0"/>
+          <a:chExt cx="0" cy="0"/>
+        </a:xfrm>
+      </p:grpSpPr>
+      <p:sp>
+        <p:nvSpPr>
+          <p:cNvPr id="2" name="Title 1"/>
+          <p:cNvSpPr>
+            <a:spLocks noGrp="1"/>
+          </p:cNvSpPr>
+          <p:nvPr>
+            <p:ph type="title"/>
+          </p:nvPr>
+        </p:nvSpPr>
+        <p:spPr/>
+        <p:txBody>
+          <a:bodyPr/>
+          <a:lstStyle/>
+          <a:p>
+            <a:r>
+              <a:rPr lang="en-US" dirty="0" err="1" smtClean="0"/>
+              <a:t>Escalabilidad</a:t>
+            </a:r>
+            <a:r>
+              <a:rPr lang="en-US" dirty="0" smtClean="0"/>
+              <a:t> a </a:t>
+            </a:r>
+            <a:r>
+              <a:rPr lang="en-US" dirty="0" err="1" smtClean="0"/>
+              <a:t>Futuro</a:t>
+            </a:r>
+            <a:endParaRPr lang="es-AR" dirty="0"/>
+          </a:p>
+        </p:txBody>
+      </p:sp>
+      <p:sp>
+        <p:nvSpPr>
+          <p:cNvPr id="3" name="Content Placeholder 2"/>
+          <p:cNvSpPr>
+            <a:spLocks noGrp="1"/>
+          </p:cNvSpPr>
+          <p:nvPr>
+            <p:ph idx="1"/>
+          </p:nvPr>
+        </p:nvSpPr>
+        <p:spPr/>
+        <p:txBody>
+          <a:bodyPr>
+            <a:normAutofit/>
+          </a:bodyPr>
+          <a:lstStyle/>
+          <a:p>
+            <a:r>
+              <a:rPr lang="en-US" sz="2800" dirty="0" smtClean="0"/>
+              <a:t>Caching</a:t>
+            </a:r>
+          </a:p>
+          <a:p>
+            <a:r>
+              <a:rPr lang="en-US" sz="2800" dirty="0" smtClean="0"/>
+              <a:t>Base de </a:t>
+            </a:r>
+            <a:r>
+              <a:rPr lang="en-US" sz="2800" dirty="0" err="1" smtClean="0"/>
+              <a:t>datos</a:t>
+            </a:r>
+            <a:r>
+              <a:rPr lang="en-US" sz="2800" dirty="0" smtClean="0"/>
+              <a:t> con clustering </a:t>
+            </a:r>
+          </a:p>
+          <a:p>
+            <a:r>
+              <a:rPr lang="en-US" sz="2800" dirty="0" err="1" smtClean="0"/>
+              <a:t>Múltiples</a:t>
+            </a:r>
+            <a:r>
+              <a:rPr lang="en-US" sz="2800" dirty="0" smtClean="0"/>
+              <a:t> </a:t>
+            </a:r>
+            <a:r>
+              <a:rPr lang="en-US" sz="2800" dirty="0" err="1" smtClean="0"/>
+              <a:t>servidores</a:t>
+            </a:r>
+            <a:endParaRPr lang="en-US" sz="2800" dirty="0" smtClean="0"/>
+          </a:p>
+          <a:p>
+            <a:r>
+              <a:rPr lang="en-US" sz="2800" dirty="0"/>
+              <a:t>Balance de </a:t>
+            </a:r>
+            <a:r>
+              <a:rPr lang="en-US" sz="2800" dirty="0" err="1" smtClean="0"/>
+              <a:t>carga</a:t>
+            </a:r>
+            <a:endParaRPr lang="en-US" sz="2800" dirty="0"/>
+          </a:p>
+          <a:p>
+            <a:r>
+              <a:rPr lang="en-US" sz="2800" dirty="0" smtClean="0"/>
+              <a:t>HTTP batched responses para </a:t>
+            </a:r>
+            <a:r>
+              <a:rPr lang="en-US" sz="2800" dirty="0" err="1" smtClean="0"/>
+              <a:t>mapas</a:t>
+            </a:r>
+            <a:endParaRPr lang="en-US" sz="2800" dirty="0" smtClean="0"/>
+          </a:p>
+          <a:p>
+            <a:r>
+              <a:rPr lang="en-US" sz="2800" dirty="0" err="1" smtClean="0"/>
+              <a:t>Confirmación</a:t>
+            </a:r>
+            <a:r>
+              <a:rPr lang="en-US" sz="2800" dirty="0" smtClean="0"/>
+              <a:t> </a:t>
+            </a:r>
+            <a:r>
+              <a:rPr lang="en-US" sz="2800" dirty="0" err="1" smtClean="0"/>
+              <a:t>usuarios</a:t>
+            </a:r>
+            <a:endParaRPr lang="es-AR" sz="2800" dirty="0"/>
+          </a:p>
+        </p:txBody>
+      </p:sp>
+    </p:spTree>
+    <p:extLst>
+      <p:ext uri="{BB962C8B-B14F-4D97-AF65-F5344CB8AC3E}">
+        <p14:creationId xmlns:p14="http://schemas.microsoft.com/office/powerpoint/2010/main" val="4046548601"/>
+      </p:ext>
+    </p:extLst>
+  </p:cSld>
+  <p:clrMapOvr>
+    <a:masterClrMapping/>
+  </p:clrMapOvr>
+  <p:timing>
+    <p:tnLst>
+      <p:par>
+        <p:cTn id="1" dur="indefinite" restart="never" nodeType="tmRoot"/>
+      </p:par>
+    </p:tnLst>
+  </p:timing>
+</p:sld>
+</file>
+
+<file path=ppt/slides/slide12.xml><?xml version="1.0" encoding="utf-8"?>
 <p:sld xmlns:a="http://schemas.openxmlformats.org/drawingml/2006/main" xmlns:r="http://schemas.openxmlformats.org/officeDocument/2006/relationships" xmlns:p="http://schemas.openxmlformats.org/presentationml/2006/main">
   <p:cSld>
     <p:spTree>
@@ -6348,161 +6764,7 @@
 </p:sld>
 </file>
 
-<file path=ppt/slides/slide11.xml><?xml version="1.0" encoding="utf-8"?>
-<p:sld xmlns:a="http://schemas.openxmlformats.org/drawingml/2006/main" xmlns:r="http://schemas.openxmlformats.org/officeDocument/2006/relationships" xmlns:p="http://schemas.openxmlformats.org/presentationml/2006/main">
-  <p:cSld>
-    <p:spTree>
-      <p:nvGrpSpPr>
-        <p:cNvPr id="1" name=""/>
-        <p:cNvGrpSpPr/>
-        <p:nvPr/>
-      </p:nvGrpSpPr>
-      <p:grpSpPr>
-        <a:xfrm>
-          <a:off x="0" y="0"/>
-          <a:ext cx="0" cy="0"/>
-          <a:chOff x="0" y="0"/>
-          <a:chExt cx="0" cy="0"/>
-        </a:xfrm>
-      </p:grpSpPr>
-      <p:sp>
-        <p:nvSpPr>
-          <p:cNvPr id="2" name="Title 1"/>
-          <p:cNvSpPr>
-            <a:spLocks noGrp="1"/>
-          </p:cNvSpPr>
-          <p:nvPr>
-            <p:ph type="title"/>
-          </p:nvPr>
-        </p:nvSpPr>
-        <p:spPr/>
-        <p:txBody>
-          <a:bodyPr/>
-          <a:lstStyle/>
-          <a:p>
-            <a:r>
-              <a:rPr lang="en-US" dirty="0" err="1" smtClean="0"/>
-              <a:t>Seguridad</a:t>
-            </a:r>
-            <a:endParaRPr lang="es-AR" dirty="0"/>
-          </a:p>
-        </p:txBody>
-      </p:sp>
-      <p:sp>
-        <p:nvSpPr>
-          <p:cNvPr id="3" name="Content Placeholder 2"/>
-          <p:cNvSpPr>
-            <a:spLocks noGrp="1"/>
-          </p:cNvSpPr>
-          <p:nvPr>
-            <p:ph idx="1"/>
-          </p:nvPr>
-        </p:nvSpPr>
-        <p:spPr/>
-        <p:txBody>
-          <a:bodyPr>
-            <a:normAutofit/>
-          </a:bodyPr>
-          <a:lstStyle/>
-          <a:p>
-            <a:r>
-              <a:rPr lang="en-US" sz="2800" dirty="0" err="1" smtClean="0"/>
-              <a:t>Autenticación</a:t>
-            </a:r>
-            <a:r>
-              <a:rPr lang="en-US" sz="2800" dirty="0" smtClean="0"/>
-              <a:t> </a:t>
-            </a:r>
-            <a:r>
-              <a:rPr lang="en-US" sz="2800" dirty="0" err="1" smtClean="0"/>
-              <a:t>básica</a:t>
-            </a:r>
-            <a:endParaRPr lang="en-US" sz="2800" dirty="0" smtClean="0"/>
-          </a:p>
-          <a:p>
-            <a:pPr lvl="1"/>
-            <a:r>
-              <a:rPr lang="en-US" sz="2400" dirty="0" err="1" smtClean="0"/>
-              <a:t>Todos</a:t>
-            </a:r>
-            <a:r>
-              <a:rPr lang="en-US" sz="2400" dirty="0" smtClean="0"/>
-              <a:t> </a:t>
-            </a:r>
-            <a:r>
-              <a:rPr lang="en-US" sz="2400" dirty="0" err="1" smtClean="0"/>
-              <a:t>las</a:t>
-            </a:r>
-            <a:r>
-              <a:rPr lang="en-US" sz="2400" dirty="0" smtClean="0"/>
-              <a:t> </a:t>
-            </a:r>
-            <a:r>
-              <a:rPr lang="en-US" sz="2400" dirty="0" err="1" smtClean="0"/>
-              <a:t>llamadas</a:t>
-            </a:r>
-            <a:r>
-              <a:rPr lang="en-US" sz="2400" dirty="0" smtClean="0"/>
-              <a:t> se </a:t>
-            </a:r>
-            <a:r>
-              <a:rPr lang="en-US" sz="2400" dirty="0" err="1" smtClean="0"/>
-              <a:t>autentican</a:t>
-            </a:r>
-            <a:r>
-              <a:rPr lang="en-US" sz="2400" dirty="0" smtClean="0"/>
-              <a:t> con </a:t>
-            </a:r>
-            <a:r>
-              <a:rPr lang="en-US" sz="2400" dirty="0" err="1" smtClean="0"/>
-              <a:t>credenciales</a:t>
-            </a:r>
-            <a:endParaRPr lang="en-US" sz="2400" dirty="0" smtClean="0"/>
-          </a:p>
-          <a:p>
-            <a:r>
-              <a:rPr lang="en-US" sz="2800" dirty="0" smtClean="0"/>
-              <a:t>HTTPS</a:t>
-            </a:r>
-          </a:p>
-          <a:p>
-            <a:r>
-              <a:rPr lang="en-US" sz="2800" dirty="0" err="1" smtClean="0"/>
-              <a:t>Futuro</a:t>
-            </a:r>
-            <a:r>
-              <a:rPr lang="en-US" sz="2800" dirty="0" smtClean="0"/>
-              <a:t>: </a:t>
-            </a:r>
-            <a:r>
-              <a:rPr lang="en-US" sz="2800" dirty="0" err="1" smtClean="0"/>
-              <a:t>OAuth</a:t>
-            </a:r>
-            <a:endParaRPr lang="en-US" sz="2800" dirty="0" smtClean="0"/>
-          </a:p>
-        </p:txBody>
-      </p:sp>
-    </p:spTree>
-    <p:extLst>
-      <p:ext uri="{BB962C8B-B14F-4D97-AF65-F5344CB8AC3E}">
-        <p14:creationId xmlns:p14="http://schemas.microsoft.com/office/powerpoint/2010/main" val="4205179079"/>
-      </p:ext>
-    </p:extLst>
-  </p:cSld>
-  <p:clrMapOvr>
-    <a:masterClrMapping/>
-  </p:clrMapOvr>
-  <p:timing>
-    <p:tnLst>
-      <p:par>
-        <p:cTn id="1" dur="indefinite" restart="never" nodeType="tmRoot"/>
-      </p:par>
-    </p:tnLst>
-  </p:timing>
-</p:sld>
-</file>
-
-<file path=ppt/slides/slide12.xml><?xml version="1.0" encoding="utf-8"?>
+<file path=ppt/slides/slide13.xml><?xml version="1.0" encoding="utf-8"?>
 <p:sld xmlns:a="http://schemas.openxmlformats.org/drawingml/2006/main" xmlns:r="http://schemas.openxmlformats.org/officeDocument/2006/relationships" xmlns:p="http://schemas.openxmlformats.org/presentationml/2006/main">
   <p:cSld>
     <p:spTree>
@@ -6600,7 +6862,7 @@
 </p:sld>
 </file>
 
-<file path=ppt/slides/slide13.xml><?xml version="1.0" encoding="utf-8"?>
+<file path=ppt/slides/slide14.xml><?xml version="1.0" encoding="utf-8"?>
 <p:sld xmlns:a="http://schemas.openxmlformats.org/drawingml/2006/main" xmlns:r="http://schemas.openxmlformats.org/officeDocument/2006/relationships" xmlns:p="http://schemas.openxmlformats.org/presentationml/2006/main">
   <p:cSld>
     <p:spTree>
@@ -6760,7 +7022,7 @@
 </p:sld>
 </file>
 
-<file path=ppt/slides/slide14.xml><?xml version="1.0" encoding="utf-8"?>
+<file path=ppt/slides/slide15.xml><?xml version="1.0" encoding="utf-8"?>
 <p:sld xmlns:a="http://schemas.openxmlformats.org/drawingml/2006/main" xmlns:r="http://schemas.openxmlformats.org/officeDocument/2006/relationships" xmlns:p="http://schemas.openxmlformats.org/presentationml/2006/main">
   <p:cSld>
     <p:spTree>
@@ -6794,15 +7056,7 @@
           <a:p>
             <a:r>
               <a:rPr lang="en-US" dirty="0" err="1" smtClean="0"/>
-              <a:t>Protección</a:t>
-            </a:r>
-            <a:r>
-              <a:rPr lang="en-US" dirty="0" smtClean="0"/>
-              <a:t> de los </a:t>
-            </a:r>
-            <a:r>
-              <a:rPr lang="en-US" dirty="0" err="1" smtClean="0"/>
-              <a:t>datos</a:t>
+              <a:t>Seguridad</a:t>
             </a:r>
             <a:endParaRPr lang="es-AR" dirty="0"/>
           </a:p>
@@ -6826,30 +7080,8 @@
           <a:lstStyle/>
           <a:p>
             <a:r>
-              <a:rPr lang="en-US" sz="2800" dirty="0" smtClean="0"/>
-              <a:t>IP Throttling</a:t>
-            </a:r>
-          </a:p>
-          <a:p>
-            <a:r>
               <a:rPr lang="en-US" sz="2800" dirty="0" err="1" smtClean="0"/>
-              <a:t>Limitar</a:t>
-            </a:r>
-            <a:r>
-              <a:rPr lang="en-US" sz="2800" dirty="0" smtClean="0"/>
-              <a:t> la </a:t>
-            </a:r>
-            <a:r>
-              <a:rPr lang="en-US" sz="2800" dirty="0" err="1" smtClean="0"/>
-              <a:t>cantidad</a:t>
-            </a:r>
-            <a:r>
-              <a:rPr lang="en-US" sz="2800" dirty="0" smtClean="0"/>
-              <a:t> de requests de un </a:t>
-            </a:r>
-            <a:r>
-              <a:rPr lang="en-US" sz="2800" dirty="0" err="1" smtClean="0"/>
-              <a:t>usuario</a:t>
+              <a:t>Autenticación</a:t>
             </a:r>
             <a:r>
               <a:rPr lang="en-US" sz="2800" dirty="0" smtClean="0"/>
@@ -6857,7 +7089,68 @@
             </a:r>
             <a:r>
               <a:rPr lang="en-US" sz="2800" dirty="0" err="1" smtClean="0"/>
-              <a:t>por</a:t>
+              <a:t>básica</a:t>
+            </a:r>
+            <a:endParaRPr lang="en-US" sz="2800" dirty="0" smtClean="0"/>
+          </a:p>
+          <a:p>
+            <a:pPr lvl="1"/>
+            <a:r>
+              <a:rPr lang="en-US" sz="2400" dirty="0" err="1" smtClean="0"/>
+              <a:t>Todos</a:t>
+            </a:r>
+            <a:r>
+              <a:rPr lang="en-US" sz="2400" dirty="0" smtClean="0"/>
+              <a:t> </a:t>
+            </a:r>
+            <a:r>
+              <a:rPr lang="en-US" sz="2400" dirty="0" err="1" smtClean="0"/>
+              <a:t>las</a:t>
+            </a:r>
+            <a:r>
+              <a:rPr lang="en-US" sz="2400" dirty="0" smtClean="0"/>
+              <a:t> </a:t>
+            </a:r>
+            <a:r>
+              <a:rPr lang="en-US" sz="2400" dirty="0" err="1" smtClean="0"/>
+              <a:t>llamadas</a:t>
+            </a:r>
+            <a:r>
+              <a:rPr lang="en-US" sz="2400" dirty="0" smtClean="0"/>
+              <a:t> se </a:t>
+            </a:r>
+            <a:r>
+              <a:rPr lang="en-US" sz="2400" dirty="0" err="1" smtClean="0"/>
+              <a:t>autentican</a:t>
+            </a:r>
+            <a:r>
+              <a:rPr lang="en-US" sz="2400" dirty="0" smtClean="0"/>
+              <a:t> con </a:t>
+            </a:r>
+            <a:r>
+              <a:rPr lang="en-US" sz="2400" dirty="0" err="1" smtClean="0"/>
+              <a:t>credenciales</a:t>
+            </a:r>
+            <a:endParaRPr lang="en-US" sz="2400" dirty="0" smtClean="0"/>
+          </a:p>
+          <a:p>
+            <a:r>
+              <a:rPr lang="en-US" sz="2800" dirty="0" smtClean="0"/>
+              <a:t>HTTPS</a:t>
+            </a:r>
+          </a:p>
+          <a:p>
+            <a:r>
+              <a:rPr lang="en-US" sz="2800" dirty="0" err="1" smtClean="0"/>
+              <a:t>Futuro</a:t>
+            </a:r>
+            <a:r>
+              <a:rPr lang="en-US" sz="2800" dirty="0" smtClean="0"/>
+              <a:t>: </a:t>
+            </a:r>
+            <a:r>
+              <a:rPr lang="en-US" sz="2800" dirty="0" err="1" smtClean="0"/>
+              <a:t>Protocolo</a:t>
             </a:r>
             <a:r>
               <a:rPr lang="en-US" sz="2800" dirty="0" smtClean="0"/>
@@ -6865,9 +7158,165 @@
             </a:r>
             <a:r>
               <a:rPr lang="en-US" sz="2800" dirty="0" err="1" smtClean="0"/>
+              <a:t>OAuth</a:t>
+            </a:r>
+            <a:endParaRPr lang="en-US" sz="2800" dirty="0" smtClean="0"/>
+          </a:p>
+        </p:txBody>
+      </p:sp>
+    </p:spTree>
+    <p:extLst>
+      <p:ext uri="{BB962C8B-B14F-4D97-AF65-F5344CB8AC3E}">
+        <p14:creationId xmlns:p14="http://schemas.microsoft.com/office/powerpoint/2010/main" val="4205179079"/>
+      </p:ext>
+    </p:extLst>
+  </p:cSld>
+  <p:clrMapOvr>
+    <a:masterClrMapping/>
+  </p:clrMapOvr>
+  <p:timing>
+    <p:tnLst>
+      <p:par>
+        <p:cTn id="1" dur="indefinite" restart="never" nodeType="tmRoot"/>
+      </p:par>
+    </p:tnLst>
+  </p:timing>
+</p:sld>
+</file>
+
+<file path=ppt/slides/slide16.xml><?xml version="1.0" encoding="utf-8"?>
+<p:sld xmlns:a="http://schemas.openxmlformats.org/drawingml/2006/main" xmlns:r="http://schemas.openxmlformats.org/officeDocument/2006/relationships" xmlns:p="http://schemas.openxmlformats.org/presentationml/2006/main">
+  <p:cSld>
+    <p:spTree>
+      <p:nvGrpSpPr>
+        <p:cNvPr id="1" name=""/>
+        <p:cNvGrpSpPr/>
+        <p:nvPr/>
+      </p:nvGrpSpPr>
+      <p:grpSpPr>
+        <a:xfrm>
+          <a:off x="0" y="0"/>
+          <a:ext cx="0" cy="0"/>
+          <a:chOff x="0" y="0"/>
+          <a:chExt cx="0" cy="0"/>
+        </a:xfrm>
+      </p:grpSpPr>
+      <p:sp>
+        <p:nvSpPr>
+          <p:cNvPr id="2" name="Title 1"/>
+          <p:cNvSpPr>
+            <a:spLocks noGrp="1"/>
+          </p:cNvSpPr>
+          <p:nvPr>
+            <p:ph type="title"/>
+          </p:nvPr>
+        </p:nvSpPr>
+        <p:spPr/>
+        <p:txBody>
+          <a:bodyPr/>
+          <a:lstStyle/>
+          <a:p>
+            <a:r>
+              <a:rPr lang="en-US" dirty="0" err="1" smtClean="0"/>
+              <a:t>Protección</a:t>
+            </a:r>
+            <a:r>
+              <a:rPr lang="en-US" dirty="0" smtClean="0"/>
+              <a:t> de los </a:t>
+            </a:r>
+            <a:r>
+              <a:rPr lang="en-US" dirty="0" err="1" smtClean="0"/>
+              <a:t>datos</a:t>
+            </a:r>
+            <a:endParaRPr lang="es-AR" dirty="0"/>
+          </a:p>
+        </p:txBody>
+      </p:sp>
+      <p:sp>
+        <p:nvSpPr>
+          <p:cNvPr id="3" name="Content Placeholder 2"/>
+          <p:cNvSpPr>
+            <a:spLocks noGrp="1"/>
+          </p:cNvSpPr>
+          <p:nvPr>
+            <p:ph idx="1"/>
+          </p:nvPr>
+        </p:nvSpPr>
+        <p:spPr/>
+        <p:txBody>
+          <a:bodyPr>
+            <a:normAutofit/>
+          </a:bodyPr>
+          <a:lstStyle/>
+          <a:p>
+            <a:r>
+              <a:rPr lang="en-US" sz="2800" dirty="0" err="1"/>
+              <a:t>Limitar</a:t>
+            </a:r>
+            <a:r>
+              <a:rPr lang="en-US" sz="2800" dirty="0"/>
+              <a:t> la </a:t>
+            </a:r>
+            <a:r>
+              <a:rPr lang="en-US" sz="2800" dirty="0" err="1"/>
+              <a:t>cantidad</a:t>
+            </a:r>
+            <a:r>
+              <a:rPr lang="en-US" sz="2800" dirty="0"/>
+              <a:t> de </a:t>
+            </a:r>
+            <a:r>
+              <a:rPr lang="en-US" sz="2800" dirty="0" smtClean="0"/>
+              <a:t>requests </a:t>
+            </a:r>
+            <a:r>
+              <a:rPr lang="en-US" sz="2800" dirty="0" err="1" smtClean="0"/>
+              <a:t>por</a:t>
+            </a:r>
+            <a:r>
+              <a:rPr lang="en-US" sz="2800" dirty="0" smtClean="0"/>
+              <a:t> </a:t>
+            </a:r>
+            <a:r>
+              <a:rPr lang="en-US" sz="2800" dirty="0" err="1" smtClean="0"/>
               <a:t>periodo</a:t>
             </a:r>
-            <a:endParaRPr lang="es-AR" sz="2800" dirty="0"/>
+            <a:endParaRPr lang="en-US" sz="2800" dirty="0" smtClean="0"/>
+          </a:p>
+          <a:p>
+            <a:pPr lvl="1"/>
+            <a:r>
+              <a:rPr lang="en-US" sz="2600" dirty="0" smtClean="0"/>
+              <a:t>De </a:t>
+            </a:r>
+            <a:r>
+              <a:rPr lang="en-US" sz="2600" dirty="0" err="1" smtClean="0"/>
+              <a:t>una</a:t>
+            </a:r>
+            <a:r>
+              <a:rPr lang="en-US" sz="2600" dirty="0" smtClean="0"/>
+              <a:t> </a:t>
+            </a:r>
+            <a:r>
+              <a:rPr lang="en-US" sz="2600" dirty="0" err="1" smtClean="0"/>
+              <a:t>dirección</a:t>
+            </a:r>
+            <a:r>
+              <a:rPr lang="en-US" sz="2600" dirty="0" smtClean="0"/>
+              <a:t> IP</a:t>
+            </a:r>
+          </a:p>
+          <a:p>
+            <a:pPr lvl="1"/>
+            <a:r>
+              <a:rPr lang="en-US" sz="2600" dirty="0" smtClean="0"/>
+              <a:t>De un </a:t>
+            </a:r>
+            <a:r>
+              <a:rPr lang="en-US" sz="2600" dirty="0" err="1" smtClean="0"/>
+              <a:t>usuario</a:t>
+            </a:r>
+            <a:endParaRPr lang="es-AR" sz="2600" dirty="0"/>
           </a:p>
         </p:txBody>
       </p:sp>
@@ -6891,7 +7340,7 @@
 </p:sld>
 </file>
 
-<file path=ppt/slides/slide15.xml><?xml version="1.0" encoding="utf-8"?>
+<file path=ppt/slides/slide17.xml><?xml version="1.0" encoding="utf-8"?>
 <p:sld xmlns:a="http://schemas.openxmlformats.org/drawingml/2006/main" xmlns:r="http://schemas.openxmlformats.org/officeDocument/2006/relationships" xmlns:p="http://schemas.openxmlformats.org/presentationml/2006/main">
   <p:cSld>
     <p:spTree>
@@ -6974,7 +7423,7 @@
 </p:sld>
 </file>
 
-<file path=ppt/slides/slide16.xml><?xml version="1.0" encoding="utf-8"?>
+<file path=ppt/slides/slide18.xml><?xml version="1.0" encoding="utf-8"?>
 <p:sld xmlns:a="http://schemas.openxmlformats.org/drawingml/2006/main" xmlns:r="http://schemas.openxmlformats.org/officeDocument/2006/relationships" xmlns:p="http://schemas.openxmlformats.org/presentationml/2006/main">
   <p:cSld>
     <p:spTree>
@@ -7548,6 +7997,96 @@
           <a:p>
             <a:r>
               <a:rPr lang="en-US" dirty="0" err="1" smtClean="0"/>
+              <a:t>Licencias</a:t>
+            </a:r>
+            <a:endParaRPr lang="es-AR" dirty="0"/>
+          </a:p>
+        </p:txBody>
+      </p:sp>
+      <p:sp>
+        <p:nvSpPr>
+          <p:cNvPr id="3" name="Content Placeholder 2"/>
+          <p:cNvSpPr>
+            <a:spLocks noGrp="1"/>
+          </p:cNvSpPr>
+          <p:nvPr>
+            <p:ph idx="1"/>
+          </p:nvPr>
+        </p:nvSpPr>
+        <p:spPr/>
+        <p:txBody>
+          <a:bodyPr>
+            <a:normAutofit/>
+          </a:bodyPr>
+          <a:lstStyle/>
+          <a:p>
+            <a:r>
+              <a:rPr lang="en-US" sz="2800" dirty="0" smtClean="0"/>
+              <a:t>Google Play – USD 25</a:t>
+            </a:r>
+          </a:p>
+          <a:p>
+            <a:r>
+              <a:rPr lang="en-US" sz="2800" dirty="0" smtClean="0"/>
+              <a:t>App Store – USD 99/year</a:t>
+            </a:r>
+          </a:p>
+          <a:p>
+            <a:r>
+              <a:rPr lang="en-US" sz="2800" dirty="0" smtClean="0"/>
+              <a:t>Windows Phone Store – USD 19/year</a:t>
+            </a:r>
+            <a:endParaRPr lang="es-AR" sz="2800" dirty="0"/>
+          </a:p>
+        </p:txBody>
+      </p:sp>
+    </p:spTree>
+    <p:extLst>
+      <p:ext uri="{BB962C8B-B14F-4D97-AF65-F5344CB8AC3E}">
+        <p14:creationId xmlns:p14="http://schemas.microsoft.com/office/powerpoint/2010/main" val="4144815704"/>
+      </p:ext>
+    </p:extLst>
+  </p:cSld>
+  <p:clrMapOvr>
+    <a:masterClrMapping/>
+  </p:clrMapOvr>
+</p:sld>
+</file>
+
+<file path=ppt/slides/slide6.xml><?xml version="1.0" encoding="utf-8"?>
+<p:sld xmlns:a="http://schemas.openxmlformats.org/drawingml/2006/main" xmlns:r="http://schemas.openxmlformats.org/officeDocument/2006/relationships" xmlns:p="http://schemas.openxmlformats.org/presentationml/2006/main">
+  <p:cSld>
+    <p:spTree>
+      <p:nvGrpSpPr>
+        <p:cNvPr id="1" name=""/>
+        <p:cNvGrpSpPr/>
+        <p:nvPr/>
+      </p:nvGrpSpPr>
+      <p:grpSpPr>
+        <a:xfrm>
+          <a:off x="0" y="0"/>
+          <a:ext cx="0" cy="0"/>
+          <a:chOff x="0" y="0"/>
+          <a:chExt cx="0" cy="0"/>
+        </a:xfrm>
+      </p:grpSpPr>
+      <p:sp>
+        <p:nvSpPr>
+          <p:cNvPr id="2" name="Title 1"/>
+          <p:cNvSpPr>
+            <a:spLocks noGrp="1"/>
+          </p:cNvSpPr>
+          <p:nvPr>
+            <p:ph type="title"/>
+          </p:nvPr>
+        </p:nvSpPr>
+        <p:spPr/>
+        <p:txBody>
+          <a:bodyPr/>
+          <a:lstStyle/>
+          <a:p>
+            <a:r>
+              <a:rPr lang="en-US" dirty="0" err="1" smtClean="0"/>
               <a:t>Tecnologías</a:t>
             </a:r>
             <a:endParaRPr lang="es-AR" dirty="0"/>
@@ -7621,7 +8160,7 @@
 </p:sld>
 </file>
 
-<file path=ppt/slides/slide6.xml><?xml version="1.0" encoding="utf-8"?>
+<file path=ppt/slides/slide7.xml><?xml version="1.0" encoding="utf-8"?>
 <p:sld xmlns:a="http://schemas.openxmlformats.org/drawingml/2006/main" xmlns:r="http://schemas.openxmlformats.org/officeDocument/2006/relationships" xmlns:p="http://schemas.openxmlformats.org/presentationml/2006/main">
   <p:cSld>
     <p:spTree>
@@ -7673,7 +8212,7 @@
         </p:nvGrpSpPr>
         <p:grpSpPr>
           <a:xfrm>
-            <a:off x="3353273" y="1092791"/>
+            <a:off x="2950312" y="1092791"/>
             <a:ext cx="2707468" cy="1069708"/>
             <a:chOff x="5471830" y="1066800"/>
             <a:chExt cx="1737741" cy="691597"/>
@@ -7757,7 +8296,7 @@
         </p:nvSpPr>
         <p:spPr>
           <a:xfrm>
-            <a:off x="3539253" y="3532043"/>
+            <a:off x="3136292" y="3532043"/>
             <a:ext cx="2319106" cy="400111"/>
           </a:xfrm>
           <a:prstGeom prst="rect">
@@ -7804,7 +8343,7 @@
         </p:blipFill>
         <p:spPr bwMode="auto">
           <a:xfrm>
-            <a:off x="4498706" y="2804876"/>
+            <a:off x="4095745" y="2804876"/>
             <a:ext cx="371717" cy="777226"/>
           </a:xfrm>
           <a:prstGeom prst="rect">
@@ -7828,7 +8367,7 @@
         </p:nvSpPr>
         <p:spPr>
           <a:xfrm>
-            <a:off x="3539253" y="5101642"/>
+            <a:off x="3136292" y="5101642"/>
             <a:ext cx="2319106" cy="400111"/>
           </a:xfrm>
           <a:prstGeom prst="rect">
@@ -7875,7 +8414,7 @@
         </p:blipFill>
         <p:spPr bwMode="auto">
           <a:xfrm>
-            <a:off x="4539201" y="4543027"/>
+            <a:off x="4136240" y="4543027"/>
             <a:ext cx="319209" cy="558615"/>
           </a:xfrm>
           <a:prstGeom prst="rect">
@@ -7916,7 +8455,7 @@
         </p:blipFill>
         <p:spPr bwMode="auto">
           <a:xfrm>
-            <a:off x="7353479" y="3005328"/>
+            <a:off x="6950518" y="3005328"/>
             <a:ext cx="786510" cy="576774"/>
           </a:xfrm>
           <a:prstGeom prst="rect">
@@ -7940,7 +8479,7 @@
         </p:nvSpPr>
         <p:spPr>
           <a:xfrm>
-            <a:off x="6587181" y="3582102"/>
+            <a:off x="6184220" y="3582102"/>
             <a:ext cx="2319106" cy="400111"/>
           </a:xfrm>
           <a:prstGeom prst="rect">
@@ -7970,7 +8509,7 @@
         </p:nvSpPr>
         <p:spPr>
           <a:xfrm>
-            <a:off x="6708347" y="2466254"/>
+            <a:off x="6305386" y="2466254"/>
             <a:ext cx="2076773" cy="2076773"/>
           </a:xfrm>
           <a:prstGeom prst="roundRect">
@@ -8009,7 +8548,7 @@
         </p:nvSpPr>
         <p:spPr>
           <a:xfrm>
-            <a:off x="6587181" y="4142916"/>
+            <a:off x="6184220" y="4142916"/>
             <a:ext cx="2319106" cy="400111"/>
           </a:xfrm>
           <a:prstGeom prst="rect">
@@ -8039,7 +8578,7 @@
         </p:nvSpPr>
         <p:spPr>
           <a:xfrm>
-            <a:off x="9272866" y="3582102"/>
+            <a:off x="8869905" y="3582102"/>
             <a:ext cx="2319106" cy="400111"/>
           </a:xfrm>
           <a:prstGeom prst="rect">
@@ -8069,7 +8608,7 @@
         </p:nvSpPr>
         <p:spPr>
           <a:xfrm>
-            <a:off x="9394032" y="2466254"/>
+            <a:off x="8991071" y="2466254"/>
             <a:ext cx="2076773" cy="2076773"/>
           </a:xfrm>
           <a:prstGeom prst="roundRect">
@@ -8108,7 +8647,7 @@
         </p:nvSpPr>
         <p:spPr>
           <a:xfrm>
-            <a:off x="9272866" y="4142916"/>
+            <a:off x="8869905" y="4142916"/>
             <a:ext cx="2319106" cy="400111"/>
           </a:xfrm>
           <a:prstGeom prst="rect">
@@ -8155,7 +8694,7 @@
         </p:blipFill>
         <p:spPr bwMode="auto">
           <a:xfrm>
-            <a:off x="10157585" y="2937909"/>
+            <a:off x="9754624" y="2937909"/>
             <a:ext cx="549665" cy="697136"/>
           </a:xfrm>
           <a:prstGeom prst="rect">
@@ -8182,7 +8721,7 @@
         </p:nvCxnSpPr>
         <p:spPr>
           <a:xfrm flipV="1">
-            <a:off x="8139989" y="3286477"/>
+            <a:off x="7737028" y="3286477"/>
             <a:ext cx="2017596" cy="7238"/>
           </a:xfrm>
           <a:prstGeom prst="straightConnector1">
@@ -8219,7 +8758,7 @@
         </p:nvCxnSpPr>
         <p:spPr>
           <a:xfrm>
-            <a:off x="4915308" y="1427590"/>
+            <a:off x="4512347" y="1427590"/>
             <a:ext cx="2438171" cy="1866125"/>
           </a:xfrm>
           <a:prstGeom prst="straightConnector1">
@@ -8255,7 +8794,7 @@
         </p:nvCxnSpPr>
         <p:spPr>
           <a:xfrm>
-            <a:off x="4870423" y="3193489"/>
+            <a:off x="4467462" y="3193489"/>
             <a:ext cx="2361889" cy="92988"/>
           </a:xfrm>
           <a:prstGeom prst="straightConnector1">
@@ -8292,7 +8831,7 @@
         </p:nvCxnSpPr>
         <p:spPr>
           <a:xfrm flipV="1">
-            <a:off x="4858410" y="3293715"/>
+            <a:off x="4455449" y="3293715"/>
             <a:ext cx="2495069" cy="1528620"/>
           </a:xfrm>
           <a:prstGeom prst="straightConnector1">
@@ -8343,7 +8882,7 @@
         </p:blipFill>
         <p:spPr bwMode="auto">
           <a:xfrm>
-            <a:off x="6005733" y="1602536"/>
+            <a:off x="5602772" y="1602536"/>
             <a:ext cx="428628" cy="586544"/>
           </a:xfrm>
           <a:prstGeom prst="rect">
@@ -8384,7 +8923,7 @@
         </p:blipFill>
         <p:spPr bwMode="auto">
           <a:xfrm>
-            <a:off x="5516164" y="2562978"/>
+            <a:off x="5113203" y="2562978"/>
             <a:ext cx="428628" cy="586544"/>
           </a:xfrm>
           <a:prstGeom prst="rect">
@@ -8425,7 +8964,7 @@
         </p:blipFill>
         <p:spPr bwMode="auto">
           <a:xfrm>
-            <a:off x="5804802" y="4345072"/>
+            <a:off x="5401841" y="4345072"/>
             <a:ext cx="428628" cy="586544"/>
           </a:xfrm>
           <a:prstGeom prst="rect">
@@ -8441,190 +8980,51 @@
           <a:effectLst/>
         </p:spPr>
       </p:pic>
+      <p:sp>
+        <p:nvSpPr>
+          <p:cNvPr id="32" name="Cloud 31"/>
+          <p:cNvSpPr/>
+          <p:nvPr/>
+        </p:nvSpPr>
+        <p:spPr>
+          <a:xfrm>
+            <a:off x="5663654" y="1762388"/>
+            <a:ext cx="5929078" cy="3339254"/>
+          </a:xfrm>
+          <a:prstGeom prst="cloud">
+            <a:avLst/>
+          </a:prstGeom>
+          <a:noFill/>
+        </p:spPr>
+        <p:style>
+          <a:lnRef idx="2">
+            <a:schemeClr val="accent1">
+              <a:shade val="50000"/>
+            </a:schemeClr>
+          </a:lnRef>
+          <a:fillRef idx="1">
+            <a:schemeClr val="accent1"/>
+          </a:fillRef>
+          <a:effectRef idx="0">
+            <a:schemeClr val="accent1"/>
+          </a:effectRef>
+          <a:fontRef idx="minor">
+            <a:schemeClr val="lt1"/>
+          </a:fontRef>
+        </p:style>
+        <p:txBody>
+          <a:bodyPr rtlCol="0" anchor="ctr"/>
+          <a:lstStyle/>
+          <a:p>
+            <a:pPr algn="ctr"/>
+            <a:endParaRPr lang="es-AR"/>
+          </a:p>
+        </p:txBody>
+      </p:sp>
     </p:spTree>
     <p:extLst>
       <p:ext uri="{BB962C8B-B14F-4D97-AF65-F5344CB8AC3E}">
         <p14:creationId xmlns:p14="http://schemas.microsoft.com/office/powerpoint/2010/main" val="730829300"/>
-      </p:ext>
-    </p:extLst>
-  </p:cSld>
-  <p:clrMapOvr>
-    <a:masterClrMapping/>
-  </p:clrMapOvr>
-  <p:timing>
-    <p:tnLst>
-      <p:par>
-        <p:cTn id="1" dur="indefinite" restart="never" nodeType="tmRoot"/>
-      </p:par>
-    </p:tnLst>
-  </p:timing>
-</p:sld>
-</file>
-
-<file path=ppt/slides/slide7.xml><?xml version="1.0" encoding="utf-8"?>
-<p:sld xmlns:a="http://schemas.openxmlformats.org/drawingml/2006/main" xmlns:r="http://schemas.openxmlformats.org/officeDocument/2006/relationships" xmlns:p="http://schemas.openxmlformats.org/presentationml/2006/main">
-  <p:cSld>
-    <p:spTree>
-      <p:nvGrpSpPr>
-        <p:cNvPr id="1" name=""/>
-        <p:cNvGrpSpPr/>
-        <p:nvPr/>
-      </p:nvGrpSpPr>
-      <p:grpSpPr>
-        <a:xfrm>
-          <a:off x="0" y="0"/>
-          <a:ext cx="0" cy="0"/>
-          <a:chOff x="0" y="0"/>
-          <a:chExt cx="0" cy="0"/>
-        </a:xfrm>
-      </p:grpSpPr>
-      <p:sp>
-        <p:nvSpPr>
-          <p:cNvPr id="2" name="Title 1"/>
-          <p:cNvSpPr>
-            <a:spLocks noGrp="1"/>
-          </p:cNvSpPr>
-          <p:nvPr>
-            <p:ph type="title"/>
-          </p:nvPr>
-        </p:nvSpPr>
-        <p:spPr/>
-        <p:txBody>
-          <a:bodyPr/>
-          <a:lstStyle/>
-          <a:p>
-            <a:r>
-              <a:rPr lang="en-US" dirty="0" err="1" smtClean="0"/>
-              <a:t>Infraestructura</a:t>
-            </a:r>
-            <a:endParaRPr lang="es-AR" dirty="0"/>
-          </a:p>
-        </p:txBody>
-      </p:sp>
-      <p:sp>
-        <p:nvSpPr>
-          <p:cNvPr id="3" name="Content Placeholder 2"/>
-          <p:cNvSpPr>
-            <a:spLocks noGrp="1"/>
-          </p:cNvSpPr>
-          <p:nvPr>
-            <p:ph idx="1"/>
-          </p:nvPr>
-        </p:nvSpPr>
-        <p:spPr/>
-        <p:txBody>
-          <a:bodyPr>
-            <a:normAutofit/>
-          </a:bodyPr>
-          <a:lstStyle/>
-          <a:p>
-            <a:pPr marL="0" indent="0">
-              <a:buNone/>
-            </a:pPr>
-            <a:r>
-              <a:rPr lang="en-US" sz="3600" dirty="0" smtClean="0"/>
-              <a:t>Windows Azure</a:t>
-            </a:r>
-          </a:p>
-          <a:p>
-            <a:r>
-              <a:rPr lang="en-US" sz="2800" dirty="0" smtClean="0"/>
-              <a:t>Azure Web Sites </a:t>
-            </a:r>
-          </a:p>
-          <a:p>
-            <a:r>
-              <a:rPr lang="en-US" sz="2800" dirty="0" smtClean="0"/>
-              <a:t>Azure Storage Blobs (</a:t>
-            </a:r>
-            <a:r>
-              <a:rPr lang="en-US" sz="2800" dirty="0" err="1" smtClean="0"/>
-              <a:t>fotos</a:t>
-            </a:r>
-            <a:r>
-              <a:rPr lang="en-US" sz="2800" dirty="0" smtClean="0"/>
-              <a:t>)</a:t>
-            </a:r>
-          </a:p>
-          <a:p>
-            <a:r>
-              <a:rPr lang="en-US" sz="2800" dirty="0" smtClean="0"/>
-              <a:t>SQL Azure (</a:t>
-            </a:r>
-            <a:r>
-              <a:rPr lang="en-US" sz="2800" dirty="0" err="1" smtClean="0"/>
-              <a:t>demás</a:t>
-            </a:r>
-            <a:r>
-              <a:rPr lang="en-US" sz="2800" dirty="0" smtClean="0"/>
-              <a:t> </a:t>
-            </a:r>
-            <a:r>
-              <a:rPr lang="en-US" sz="2800" dirty="0" err="1" smtClean="0"/>
-              <a:t>datos</a:t>
-            </a:r>
-            <a:r>
-              <a:rPr lang="en-US" sz="2800" dirty="0" smtClean="0"/>
-              <a:t>)</a:t>
-            </a:r>
-          </a:p>
-          <a:p>
-            <a:pPr marL="0" indent="0">
-              <a:buNone/>
-            </a:pPr>
-            <a:r>
-              <a:rPr lang="en-US" sz="3600" dirty="0" err="1" smtClean="0"/>
-              <a:t>Beneficios</a:t>
-            </a:r>
-            <a:endParaRPr lang="en-US" sz="3600" dirty="0" smtClean="0"/>
-          </a:p>
-          <a:p>
-            <a:r>
-              <a:rPr lang="en-US" sz="2800" dirty="0" err="1" smtClean="0"/>
-              <a:t>Escalabilidad</a:t>
-            </a:r>
-            <a:r>
-              <a:rPr lang="en-US" sz="2800" dirty="0" smtClean="0"/>
-              <a:t> on-demand</a:t>
-            </a:r>
-          </a:p>
-          <a:p>
-            <a:r>
-              <a:rPr lang="en-US" sz="2800" dirty="0" smtClean="0"/>
-              <a:t>Load-balancing</a:t>
-            </a:r>
-          </a:p>
-          <a:p>
-            <a:r>
-              <a:rPr lang="en-US" sz="2800" dirty="0" smtClean="0"/>
-              <a:t>CDN</a:t>
-            </a:r>
-          </a:p>
-          <a:p>
-            <a:r>
-              <a:rPr lang="en-US" sz="2800" dirty="0" smtClean="0"/>
-              <a:t>No </a:t>
-            </a:r>
-            <a:r>
-              <a:rPr lang="en-US" sz="2800" dirty="0" err="1" smtClean="0"/>
-              <a:t>necesita</a:t>
-            </a:r>
-            <a:r>
-              <a:rPr lang="en-US" sz="2800" dirty="0" smtClean="0"/>
-              <a:t> personal IT </a:t>
-            </a:r>
-            <a:r>
-              <a:rPr lang="en-US" sz="2800" dirty="0" err="1" smtClean="0"/>
-              <a:t>dedicado</a:t>
-            </a:r>
-            <a:endParaRPr lang="es-AR" sz="2800" dirty="0"/>
-          </a:p>
-        </p:txBody>
-      </p:sp>
-    </p:spTree>
-    <p:extLst>
-      <p:ext uri="{BB962C8B-B14F-4D97-AF65-F5344CB8AC3E}">
-        <p14:creationId xmlns:p14="http://schemas.microsoft.com/office/powerpoint/2010/main" val="1268582405"/>
       </p:ext>
     </p:extLst>
   </p:cSld>
@@ -8674,129 +9074,790 @@
           <a:lstStyle/>
           <a:p>
             <a:r>
+              <a:rPr lang="en-US" dirty="0" smtClean="0"/>
+              <a:t>Vista </a:t>
+            </a:r>
+            <a:r>
               <a:rPr lang="en-US" dirty="0" err="1" smtClean="0"/>
-              <a:t>Beneficios</a:t>
-            </a:r>
-            <a:r>
-              <a:rPr lang="en-US" dirty="0" smtClean="0"/>
-              <a:t> API REST</a:t>
+              <a:t>Lógica</a:t>
             </a:r>
             <a:endParaRPr lang="es-AR" dirty="0"/>
           </a:p>
         </p:txBody>
       </p:sp>
-      <p:sp>
-        <p:nvSpPr>
-          <p:cNvPr id="3" name="Content Placeholder 2"/>
-          <p:cNvSpPr>
-            <a:spLocks noGrp="1"/>
-          </p:cNvSpPr>
-          <p:nvPr>
-            <p:ph idx="1"/>
-          </p:nvPr>
-        </p:nvSpPr>
-        <p:spPr/>
-        <p:txBody>
-          <a:bodyPr>
-            <a:normAutofit/>
-          </a:bodyPr>
-          <a:lstStyle/>
-          <a:p>
-            <a:r>
-              <a:rPr lang="en-US" sz="2800" dirty="0" err="1" smtClean="0"/>
-              <a:t>Uniforme</a:t>
-            </a:r>
-            <a:r>
-              <a:rPr lang="en-US" sz="2800" dirty="0" smtClean="0"/>
-              <a:t> para </a:t>
-            </a:r>
-            <a:r>
-              <a:rPr lang="en-US" sz="2800" dirty="0" err="1" smtClean="0"/>
-              <a:t>todos</a:t>
-            </a:r>
-            <a:r>
-              <a:rPr lang="en-US" sz="2800" dirty="0" smtClean="0"/>
-              <a:t> los </a:t>
-            </a:r>
-            <a:r>
-              <a:rPr lang="en-US" sz="2800" dirty="0" err="1" smtClean="0"/>
-              <a:t>clientes</a:t>
-            </a:r>
-            <a:endParaRPr lang="en-US" sz="2800" dirty="0" smtClean="0"/>
-          </a:p>
-          <a:p>
-            <a:r>
-              <a:rPr lang="en-US" sz="2800" dirty="0" err="1" smtClean="0"/>
-              <a:t>Clientes</a:t>
-            </a:r>
-            <a:r>
-              <a:rPr lang="en-US" sz="2800" dirty="0" smtClean="0"/>
-              <a:t> solo </a:t>
-            </a:r>
-            <a:r>
-              <a:rPr lang="en-US" sz="2800" dirty="0" err="1"/>
-              <a:t>necesitan</a:t>
-            </a:r>
-            <a:r>
-              <a:rPr lang="en-US" sz="2800" dirty="0"/>
-              <a:t> </a:t>
-            </a:r>
-            <a:r>
-              <a:rPr lang="en-US" sz="2800" dirty="0" err="1"/>
-              <a:t>poder</a:t>
-            </a:r>
-            <a:r>
-              <a:rPr lang="en-US" sz="2800" dirty="0"/>
-              <a:t> </a:t>
-            </a:r>
-            <a:r>
-              <a:rPr lang="en-US" sz="2800" dirty="0" err="1"/>
-              <a:t>consumir</a:t>
-            </a:r>
-            <a:r>
-              <a:rPr lang="en-US" sz="2800" dirty="0"/>
-              <a:t> </a:t>
-            </a:r>
-            <a:r>
-              <a:rPr lang="en-US" sz="2800" dirty="0" smtClean="0"/>
-              <a:t>HTTP</a:t>
-            </a:r>
-          </a:p>
-          <a:p>
-            <a:r>
-              <a:rPr lang="en-US" sz="2800" dirty="0" err="1" smtClean="0"/>
-              <a:t>Abstrae</a:t>
-            </a:r>
-            <a:r>
-              <a:rPr lang="en-US" sz="2800" dirty="0" smtClean="0"/>
-              <a:t> la </a:t>
-            </a:r>
-            <a:r>
-              <a:rPr lang="en-US" sz="2800" dirty="0" err="1" smtClean="0"/>
-              <a:t>plataforma</a:t>
-            </a:r>
-            <a:r>
-              <a:rPr lang="en-US" sz="2800" dirty="0" smtClean="0"/>
-              <a:t> del </a:t>
-            </a:r>
-            <a:r>
-              <a:rPr lang="en-US" sz="2800" dirty="0" err="1" smtClean="0"/>
-              <a:t>servidor</a:t>
-            </a:r>
-            <a:endParaRPr lang="en-US" sz="2800" dirty="0" smtClean="0"/>
-          </a:p>
-          <a:p>
-            <a:r>
-              <a:rPr lang="en-US" sz="2800" dirty="0" smtClean="0"/>
-              <a:t>Caching HTTP</a:t>
-            </a:r>
-          </a:p>
-        </p:txBody>
-      </p:sp>
+      <p:grpSp>
+        <p:nvGrpSpPr>
+          <p:cNvPr id="12" name="Group 11"/>
+          <p:cNvGrpSpPr/>
+          <p:nvPr/>
+        </p:nvGrpSpPr>
+        <p:grpSpPr>
+          <a:xfrm>
+            <a:off x="5080565" y="725775"/>
+            <a:ext cx="4510008" cy="2426233"/>
+            <a:chOff x="4525504" y="746926"/>
+            <a:chExt cx="5564290" cy="3196472"/>
+          </a:xfrm>
+        </p:grpSpPr>
+        <p:sp>
+          <p:nvSpPr>
+            <p:cNvPr id="4" name="Rectangle 3"/>
+            <p:cNvSpPr/>
+            <p:nvPr/>
+          </p:nvSpPr>
+          <p:spPr>
+            <a:xfrm>
+              <a:off x="4525504" y="746926"/>
+              <a:ext cx="5564290" cy="3196472"/>
+            </a:xfrm>
+            <a:prstGeom prst="rect">
+              <a:avLst/>
+            </a:prstGeom>
+            <a:solidFill>
+              <a:schemeClr val="accent2">
+                <a:lumMod val="20000"/>
+                <a:lumOff val="80000"/>
+              </a:schemeClr>
+            </a:solidFill>
+            <a:ln>
+              <a:noFill/>
+            </a:ln>
+          </p:spPr>
+          <p:style>
+            <a:lnRef idx="1">
+              <a:schemeClr val="accent2"/>
+            </a:lnRef>
+            <a:fillRef idx="2">
+              <a:schemeClr val="accent2"/>
+            </a:fillRef>
+            <a:effectRef idx="1">
+              <a:schemeClr val="accent2"/>
+            </a:effectRef>
+            <a:fontRef idx="minor">
+              <a:schemeClr val="dk1"/>
+            </a:fontRef>
+          </p:style>
+          <p:txBody>
+            <a:bodyPr rtlCol="0" anchor="ctr"/>
+            <a:lstStyle/>
+            <a:p>
+              <a:pPr algn="ctr"/>
+              <a:endParaRPr lang="es-AR"/>
+            </a:p>
+          </p:txBody>
+        </p:sp>
+        <p:sp>
+          <p:nvSpPr>
+            <p:cNvPr id="5" name="Rounded Rectangle 4"/>
+            <p:cNvSpPr/>
+            <p:nvPr/>
+          </p:nvSpPr>
+          <p:spPr>
+            <a:xfrm>
+              <a:off x="8306843" y="2165011"/>
+              <a:ext cx="1607363" cy="606788"/>
+            </a:xfrm>
+            <a:prstGeom prst="roundRect">
+              <a:avLst/>
+            </a:prstGeom>
+          </p:spPr>
+          <p:style>
+            <a:lnRef idx="1">
+              <a:schemeClr val="accent6"/>
+            </a:lnRef>
+            <a:fillRef idx="2">
+              <a:schemeClr val="accent6"/>
+            </a:fillRef>
+            <a:effectRef idx="1">
+              <a:schemeClr val="accent6"/>
+            </a:effectRef>
+            <a:fontRef idx="minor">
+              <a:schemeClr val="dk1"/>
+            </a:fontRef>
+          </p:style>
+          <p:txBody>
+            <a:bodyPr rtlCol="0" anchor="ctr"/>
+            <a:lstStyle/>
+            <a:p>
+              <a:pPr algn="ctr"/>
+              <a:r>
+                <a:rPr lang="es-AR" dirty="0" smtClean="0"/>
+                <a:t>REST API </a:t>
+              </a:r>
+              <a:r>
+                <a:rPr lang="es-AR" dirty="0" err="1" smtClean="0"/>
+                <a:t>Services</a:t>
+              </a:r>
+              <a:endParaRPr lang="es-AR" dirty="0"/>
+            </a:p>
+          </p:txBody>
+        </p:sp>
+        <p:sp>
+          <p:nvSpPr>
+            <p:cNvPr id="6" name="Rounded Rectangle 5"/>
+            <p:cNvSpPr/>
+            <p:nvPr/>
+          </p:nvSpPr>
+          <p:spPr>
+            <a:xfrm>
+              <a:off x="4701094" y="2148931"/>
+              <a:ext cx="1575179" cy="606788"/>
+            </a:xfrm>
+            <a:prstGeom prst="roundRect">
+              <a:avLst/>
+            </a:prstGeom>
+          </p:spPr>
+          <p:style>
+            <a:lnRef idx="1">
+              <a:schemeClr val="accent4"/>
+            </a:lnRef>
+            <a:fillRef idx="2">
+              <a:schemeClr val="accent4"/>
+            </a:fillRef>
+            <a:effectRef idx="1">
+              <a:schemeClr val="accent4"/>
+            </a:effectRef>
+            <a:fontRef idx="minor">
+              <a:schemeClr val="dk1"/>
+            </a:fontRef>
+          </p:style>
+          <p:txBody>
+            <a:bodyPr rtlCol="0" anchor="ctr"/>
+            <a:lstStyle/>
+            <a:p>
+              <a:pPr algn="ctr"/>
+              <a:r>
+                <a:rPr lang="es-AR" dirty="0" err="1" smtClean="0"/>
+                <a:t>Model</a:t>
+              </a:r>
+              <a:endParaRPr lang="es-AR" dirty="0"/>
+            </a:p>
+          </p:txBody>
+        </p:sp>
+        <p:sp>
+          <p:nvSpPr>
+            <p:cNvPr id="7" name="Rounded Rectangle 6"/>
+            <p:cNvSpPr/>
+            <p:nvPr/>
+          </p:nvSpPr>
+          <p:spPr>
+            <a:xfrm>
+              <a:off x="4701094" y="939959"/>
+              <a:ext cx="5213112" cy="606788"/>
+            </a:xfrm>
+            <a:prstGeom prst="roundRect">
+              <a:avLst/>
+            </a:prstGeom>
+          </p:spPr>
+          <p:style>
+            <a:lnRef idx="1">
+              <a:schemeClr val="accent5"/>
+            </a:lnRef>
+            <a:fillRef idx="2">
+              <a:schemeClr val="accent5"/>
+            </a:fillRef>
+            <a:effectRef idx="1">
+              <a:schemeClr val="accent5"/>
+            </a:effectRef>
+            <a:fontRef idx="minor">
+              <a:schemeClr val="dk1"/>
+            </a:fontRef>
+          </p:style>
+          <p:txBody>
+            <a:bodyPr rtlCol="0" anchor="ctr"/>
+            <a:lstStyle/>
+            <a:p>
+              <a:pPr algn="ctr"/>
+              <a:r>
+                <a:rPr lang="es-AR" dirty="0" smtClean="0"/>
+                <a:t>View</a:t>
+              </a:r>
+              <a:endParaRPr lang="es-AR" dirty="0"/>
+            </a:p>
+          </p:txBody>
+        </p:sp>
+        <p:sp>
+          <p:nvSpPr>
+            <p:cNvPr id="8" name="Rounded Rectangle 7"/>
+            <p:cNvSpPr/>
+            <p:nvPr/>
+          </p:nvSpPr>
+          <p:spPr>
+            <a:xfrm>
+              <a:off x="4701094" y="1546747"/>
+              <a:ext cx="5213112" cy="606788"/>
+            </a:xfrm>
+            <a:prstGeom prst="roundRect">
+              <a:avLst/>
+            </a:prstGeom>
+          </p:spPr>
+          <p:style>
+            <a:lnRef idx="1">
+              <a:schemeClr val="accent3"/>
+            </a:lnRef>
+            <a:fillRef idx="2">
+              <a:schemeClr val="accent3"/>
+            </a:fillRef>
+            <a:effectRef idx="1">
+              <a:schemeClr val="accent3"/>
+            </a:effectRef>
+            <a:fontRef idx="minor">
+              <a:schemeClr val="dk1"/>
+            </a:fontRef>
+          </p:style>
+          <p:txBody>
+            <a:bodyPr rtlCol="0" anchor="ctr"/>
+            <a:lstStyle/>
+            <a:p>
+              <a:pPr algn="ctr"/>
+              <a:r>
+                <a:rPr lang="es-AR" dirty="0" err="1" smtClean="0"/>
+                <a:t>Controller</a:t>
+              </a:r>
+              <a:endParaRPr lang="es-AR" dirty="0"/>
+            </a:p>
+          </p:txBody>
+        </p:sp>
+        <p:sp>
+          <p:nvSpPr>
+            <p:cNvPr id="9" name="Rounded Rectangle 8"/>
+            <p:cNvSpPr/>
+            <p:nvPr/>
+          </p:nvSpPr>
+          <p:spPr>
+            <a:xfrm>
+              <a:off x="4701094" y="2783275"/>
+              <a:ext cx="5213113" cy="606788"/>
+            </a:xfrm>
+            <a:prstGeom prst="roundRect">
+              <a:avLst/>
+            </a:prstGeom>
+            <a:gradFill>
+              <a:gsLst>
+                <a:gs pos="0">
+                  <a:schemeClr val="accent2">
+                    <a:lumMod val="75000"/>
+                  </a:schemeClr>
+                </a:gs>
+                <a:gs pos="50000">
+                  <a:schemeClr val="accent2">
+                    <a:lumMod val="75000"/>
+                  </a:schemeClr>
+                </a:gs>
+                <a:gs pos="100000">
+                  <a:schemeClr val="accent2"/>
+                </a:gs>
+              </a:gsLst>
+            </a:gradFill>
+          </p:spPr>
+          <p:style>
+            <a:lnRef idx="1">
+              <a:schemeClr val="dk1"/>
+            </a:lnRef>
+            <a:fillRef idx="2">
+              <a:schemeClr val="dk1"/>
+            </a:fillRef>
+            <a:effectRef idx="1">
+              <a:schemeClr val="dk1"/>
+            </a:effectRef>
+            <a:fontRef idx="minor">
+              <a:schemeClr val="dk1"/>
+            </a:fontRef>
+          </p:style>
+          <p:txBody>
+            <a:bodyPr rtlCol="0" anchor="ctr"/>
+            <a:lstStyle/>
+            <a:p>
+              <a:pPr algn="ctr"/>
+              <a:r>
+                <a:rPr lang="es-AR" dirty="0" smtClean="0"/>
+                <a:t>Mobile </a:t>
+              </a:r>
+              <a:r>
+                <a:rPr lang="es-AR" dirty="0" err="1" smtClean="0"/>
+                <a:t>Platform</a:t>
+              </a:r>
+              <a:r>
+                <a:rPr lang="es-AR" dirty="0" smtClean="0"/>
+                <a:t> Framework &amp; </a:t>
+              </a:r>
+              <a:r>
+                <a:rPr lang="es-AR" dirty="0" err="1" smtClean="0"/>
+                <a:t>Libraries</a:t>
+              </a:r>
+              <a:endParaRPr lang="es-AR" dirty="0"/>
+            </a:p>
+          </p:txBody>
+        </p:sp>
+        <p:sp>
+          <p:nvSpPr>
+            <p:cNvPr id="10" name="Rounded Rectangle 9"/>
+            <p:cNvSpPr/>
+            <p:nvPr/>
+          </p:nvSpPr>
+          <p:spPr>
+            <a:xfrm>
+              <a:off x="6292364" y="2165011"/>
+              <a:ext cx="2030571" cy="606788"/>
+            </a:xfrm>
+            <a:prstGeom prst="roundRect">
+              <a:avLst/>
+            </a:prstGeom>
+            <a:gradFill>
+              <a:gsLst>
+                <a:gs pos="0">
+                  <a:srgbClr val="FC9280"/>
+                </a:gs>
+                <a:gs pos="50000">
+                  <a:srgbClr val="EE5140"/>
+                </a:gs>
+                <a:gs pos="100000">
+                  <a:srgbClr val="FC2610"/>
+                </a:gs>
+              </a:gsLst>
+            </a:gradFill>
+          </p:spPr>
+          <p:style>
+            <a:lnRef idx="1">
+              <a:schemeClr val="accent6"/>
+            </a:lnRef>
+            <a:fillRef idx="2">
+              <a:schemeClr val="accent6"/>
+            </a:fillRef>
+            <a:effectRef idx="1">
+              <a:schemeClr val="accent6"/>
+            </a:effectRef>
+            <a:fontRef idx="minor">
+              <a:schemeClr val="dk1"/>
+            </a:fontRef>
+          </p:style>
+          <p:txBody>
+            <a:bodyPr rtlCol="0" anchor="ctr"/>
+            <a:lstStyle/>
+            <a:p>
+              <a:pPr algn="ctr"/>
+              <a:r>
+                <a:rPr lang="es-AR" dirty="0" err="1" smtClean="0"/>
+                <a:t>Other</a:t>
+              </a:r>
+              <a:r>
+                <a:rPr lang="es-AR" dirty="0" smtClean="0"/>
+                <a:t> </a:t>
+              </a:r>
+              <a:r>
+                <a:rPr lang="es-AR" dirty="0" err="1" smtClean="0"/>
+                <a:t>Services</a:t>
+              </a:r>
+              <a:endParaRPr lang="es-AR" dirty="0"/>
+            </a:p>
+          </p:txBody>
+        </p:sp>
+        <p:sp>
+          <p:nvSpPr>
+            <p:cNvPr id="11" name="TextBox 10"/>
+            <p:cNvSpPr txBox="1"/>
+            <p:nvPr/>
+          </p:nvSpPr>
+          <p:spPr>
+            <a:xfrm>
+              <a:off x="4650060" y="3456817"/>
+              <a:ext cx="1328661" cy="486581"/>
+            </a:xfrm>
+            <a:prstGeom prst="rect">
+              <a:avLst/>
+            </a:prstGeom>
+            <a:noFill/>
+          </p:spPr>
+          <p:txBody>
+            <a:bodyPr wrap="square" rtlCol="0">
+              <a:spAutoFit/>
+            </a:bodyPr>
+            <a:lstStyle/>
+            <a:p>
+              <a:r>
+                <a:rPr lang="es-AR" b="1" dirty="0" smtClean="0"/>
+                <a:t>Cliente</a:t>
+              </a:r>
+              <a:endParaRPr lang="es-AR" b="1" dirty="0"/>
+            </a:p>
+          </p:txBody>
+        </p:sp>
+      </p:grpSp>
+      <p:grpSp>
+        <p:nvGrpSpPr>
+          <p:cNvPr id="20" name="Group 19"/>
+          <p:cNvGrpSpPr/>
+          <p:nvPr/>
+        </p:nvGrpSpPr>
+        <p:grpSpPr>
+          <a:xfrm>
+            <a:off x="5080565" y="3450123"/>
+            <a:ext cx="4491633" cy="2495088"/>
+            <a:chOff x="2073498" y="1594023"/>
+            <a:chExt cx="7517076" cy="4175711"/>
+          </a:xfrm>
+        </p:grpSpPr>
+        <p:sp>
+          <p:nvSpPr>
+            <p:cNvPr id="13" name="Rectangle 12"/>
+            <p:cNvSpPr/>
+            <p:nvPr/>
+          </p:nvSpPr>
+          <p:spPr>
+            <a:xfrm>
+              <a:off x="2073498" y="1609858"/>
+              <a:ext cx="7517076" cy="4159876"/>
+            </a:xfrm>
+            <a:prstGeom prst="rect">
+              <a:avLst/>
+            </a:prstGeom>
+            <a:solidFill>
+              <a:schemeClr val="accent2">
+                <a:lumMod val="20000"/>
+                <a:lumOff val="80000"/>
+              </a:schemeClr>
+            </a:solidFill>
+            <a:ln>
+              <a:noFill/>
+            </a:ln>
+          </p:spPr>
+          <p:style>
+            <a:lnRef idx="1">
+              <a:schemeClr val="accent2"/>
+            </a:lnRef>
+            <a:fillRef idx="2">
+              <a:schemeClr val="accent2"/>
+            </a:fillRef>
+            <a:effectRef idx="1">
+              <a:schemeClr val="accent2"/>
+            </a:effectRef>
+            <a:fontRef idx="minor">
+              <a:schemeClr val="dk1"/>
+            </a:fontRef>
+          </p:style>
+          <p:txBody>
+            <a:bodyPr rtlCol="0" anchor="ctr"/>
+            <a:lstStyle/>
+            <a:p>
+              <a:pPr algn="ctr"/>
+              <a:endParaRPr lang="es-AR"/>
+            </a:p>
+          </p:txBody>
+        </p:sp>
+        <p:sp>
+          <p:nvSpPr>
+            <p:cNvPr id="14" name="Rounded Rectangle 13"/>
+            <p:cNvSpPr/>
+            <p:nvPr/>
+          </p:nvSpPr>
+          <p:spPr>
+            <a:xfrm>
+              <a:off x="2336797" y="2189408"/>
+              <a:ext cx="7042652" cy="819740"/>
+            </a:xfrm>
+            <a:prstGeom prst="roundRect">
+              <a:avLst/>
+            </a:prstGeom>
+          </p:spPr>
+          <p:style>
+            <a:lnRef idx="1">
+              <a:schemeClr val="accent5"/>
+            </a:lnRef>
+            <a:fillRef idx="2">
+              <a:schemeClr val="accent5"/>
+            </a:fillRef>
+            <a:effectRef idx="1">
+              <a:schemeClr val="accent5"/>
+            </a:effectRef>
+            <a:fontRef idx="minor">
+              <a:schemeClr val="dk1"/>
+            </a:fontRef>
+          </p:style>
+          <p:txBody>
+            <a:bodyPr rtlCol="0" anchor="ctr"/>
+            <a:lstStyle/>
+            <a:p>
+              <a:pPr algn="ctr"/>
+              <a:r>
+                <a:rPr lang="es-AR" dirty="0" smtClean="0"/>
+                <a:t>REST API</a:t>
+              </a:r>
+              <a:endParaRPr lang="es-AR" dirty="0"/>
+            </a:p>
+          </p:txBody>
+        </p:sp>
+        <p:sp>
+          <p:nvSpPr>
+            <p:cNvPr id="15" name="Rounded Rectangle 14"/>
+            <p:cNvSpPr/>
+            <p:nvPr/>
+          </p:nvSpPr>
+          <p:spPr>
+            <a:xfrm>
+              <a:off x="2336797" y="3817528"/>
+              <a:ext cx="7042652" cy="819740"/>
+            </a:xfrm>
+            <a:prstGeom prst="roundRect">
+              <a:avLst/>
+            </a:prstGeom>
+          </p:spPr>
+          <p:style>
+            <a:lnRef idx="1">
+              <a:schemeClr val="accent3"/>
+            </a:lnRef>
+            <a:fillRef idx="2">
+              <a:schemeClr val="accent3"/>
+            </a:fillRef>
+            <a:effectRef idx="1">
+              <a:schemeClr val="accent3"/>
+            </a:effectRef>
+            <a:fontRef idx="minor">
+              <a:schemeClr val="dk1"/>
+            </a:fontRef>
+          </p:style>
+          <p:txBody>
+            <a:bodyPr rtlCol="0" anchor="ctr"/>
+            <a:lstStyle/>
+            <a:p>
+              <a:pPr algn="ctr"/>
+              <a:r>
+                <a:rPr lang="es-AR" dirty="0" smtClean="0"/>
+                <a:t>Business </a:t>
+              </a:r>
+              <a:r>
+                <a:rPr lang="es-AR" dirty="0" err="1" smtClean="0"/>
+                <a:t>Layer</a:t>
+              </a:r>
+              <a:endParaRPr lang="es-AR" dirty="0"/>
+            </a:p>
+          </p:txBody>
+        </p:sp>
+        <p:sp>
+          <p:nvSpPr>
+            <p:cNvPr id="16" name="Rounded Rectangle 15"/>
+            <p:cNvSpPr/>
+            <p:nvPr/>
+          </p:nvSpPr>
+          <p:spPr>
+            <a:xfrm>
+              <a:off x="2336796" y="4648628"/>
+              <a:ext cx="7042653" cy="819740"/>
+            </a:xfrm>
+            <a:prstGeom prst="roundRect">
+              <a:avLst/>
+            </a:prstGeom>
+            <a:gradFill>
+              <a:gsLst>
+                <a:gs pos="0">
+                  <a:schemeClr val="accent2">
+                    <a:lumMod val="75000"/>
+                  </a:schemeClr>
+                </a:gs>
+                <a:gs pos="50000">
+                  <a:schemeClr val="accent2">
+                    <a:lumMod val="75000"/>
+                  </a:schemeClr>
+                </a:gs>
+                <a:gs pos="100000">
+                  <a:schemeClr val="accent2"/>
+                </a:gs>
+              </a:gsLst>
+            </a:gradFill>
+          </p:spPr>
+          <p:style>
+            <a:lnRef idx="1">
+              <a:schemeClr val="dk1"/>
+            </a:lnRef>
+            <a:fillRef idx="2">
+              <a:schemeClr val="dk1"/>
+            </a:fillRef>
+            <a:effectRef idx="1">
+              <a:schemeClr val="dk1"/>
+            </a:effectRef>
+            <a:fontRef idx="minor">
+              <a:schemeClr val="dk1"/>
+            </a:fontRef>
+          </p:style>
+          <p:txBody>
+            <a:bodyPr rtlCol="0" anchor="ctr"/>
+            <a:lstStyle/>
+            <a:p>
+              <a:pPr algn="ctr"/>
+              <a:r>
+                <a:rPr lang="es-AR" dirty="0" err="1" smtClean="0"/>
+                <a:t>Persistence</a:t>
+              </a:r>
+              <a:r>
+                <a:rPr lang="es-AR" dirty="0" smtClean="0"/>
+                <a:t> </a:t>
+              </a:r>
+              <a:r>
+                <a:rPr lang="es-AR" dirty="0" err="1" smtClean="0"/>
+                <a:t>Layer</a:t>
+              </a:r>
+              <a:endParaRPr lang="es-AR" dirty="0"/>
+            </a:p>
+          </p:txBody>
+        </p:sp>
+        <p:sp>
+          <p:nvSpPr>
+            <p:cNvPr id="17" name="Rounded Rectangle 16"/>
+            <p:cNvSpPr/>
+            <p:nvPr/>
+          </p:nvSpPr>
+          <p:spPr>
+            <a:xfrm>
+              <a:off x="2336796" y="3020508"/>
+              <a:ext cx="7042653" cy="819740"/>
+            </a:xfrm>
+            <a:prstGeom prst="roundRect">
+              <a:avLst/>
+            </a:prstGeom>
+            <a:gradFill>
+              <a:gsLst>
+                <a:gs pos="0">
+                  <a:srgbClr val="FC9280"/>
+                </a:gs>
+                <a:gs pos="50000">
+                  <a:srgbClr val="EE5140"/>
+                </a:gs>
+                <a:gs pos="100000">
+                  <a:srgbClr val="FC2610"/>
+                </a:gs>
+              </a:gsLst>
+            </a:gradFill>
+          </p:spPr>
+          <p:style>
+            <a:lnRef idx="1">
+              <a:schemeClr val="accent6"/>
+            </a:lnRef>
+            <a:fillRef idx="2">
+              <a:schemeClr val="accent6"/>
+            </a:fillRef>
+            <a:effectRef idx="1">
+              <a:schemeClr val="accent6"/>
+            </a:effectRef>
+            <a:fontRef idx="minor">
+              <a:schemeClr val="dk1"/>
+            </a:fontRef>
+          </p:style>
+          <p:txBody>
+            <a:bodyPr rtlCol="0" anchor="ctr"/>
+            <a:lstStyle/>
+            <a:p>
+              <a:pPr algn="ctr"/>
+              <a:r>
+                <a:rPr lang="es-AR" dirty="0" err="1"/>
+                <a:t>Presentation</a:t>
+              </a:r>
+              <a:r>
+                <a:rPr lang="es-AR" dirty="0"/>
+                <a:t> </a:t>
+              </a:r>
+              <a:r>
+                <a:rPr lang="es-AR" dirty="0" err="1"/>
+                <a:t>Layer</a:t>
+              </a:r>
+              <a:r>
+                <a:rPr lang="es-AR" dirty="0"/>
+                <a:t> (</a:t>
+              </a:r>
+              <a:r>
+                <a:rPr lang="es-AR" dirty="0" err="1"/>
+                <a:t>Model</a:t>
+              </a:r>
+              <a:r>
+                <a:rPr lang="es-AR" dirty="0"/>
+                <a:t> &lt;-&gt; </a:t>
+              </a:r>
+              <a:r>
+                <a:rPr lang="es-AR" dirty="0" err="1"/>
+                <a:t>DTOs</a:t>
+              </a:r>
+              <a:r>
+                <a:rPr lang="es-AR" dirty="0"/>
+                <a:t>)</a:t>
+              </a:r>
+            </a:p>
+          </p:txBody>
+        </p:sp>
+        <p:sp>
+          <p:nvSpPr>
+            <p:cNvPr id="18" name="TextBox 17"/>
+            <p:cNvSpPr txBox="1"/>
+            <p:nvPr/>
+          </p:nvSpPr>
+          <p:spPr>
+            <a:xfrm>
+              <a:off x="2280929" y="1594023"/>
+              <a:ext cx="1961935" cy="618104"/>
+            </a:xfrm>
+            <a:prstGeom prst="rect">
+              <a:avLst/>
+            </a:prstGeom>
+            <a:noFill/>
+          </p:spPr>
+          <p:txBody>
+            <a:bodyPr wrap="square" rtlCol="0">
+              <a:spAutoFit/>
+            </a:bodyPr>
+            <a:lstStyle/>
+            <a:p>
+              <a:r>
+                <a:rPr lang="es-AR" b="1" dirty="0" smtClean="0"/>
+                <a:t>Servidor</a:t>
+              </a:r>
+              <a:endParaRPr lang="es-AR" b="1" dirty="0"/>
+            </a:p>
+          </p:txBody>
+        </p:sp>
+        <p:sp>
+          <p:nvSpPr>
+            <p:cNvPr id="19" name="Rounded Rectangle 18"/>
+            <p:cNvSpPr/>
+            <p:nvPr/>
+          </p:nvSpPr>
+          <p:spPr>
+            <a:xfrm>
+              <a:off x="2631636" y="3957264"/>
+              <a:ext cx="1760219" cy="540268"/>
+            </a:xfrm>
+            <a:prstGeom prst="roundRect">
+              <a:avLst/>
+            </a:prstGeom>
+          </p:spPr>
+          <p:style>
+            <a:lnRef idx="1">
+              <a:schemeClr val="accent4"/>
+            </a:lnRef>
+            <a:fillRef idx="2">
+              <a:schemeClr val="accent4"/>
+            </a:fillRef>
+            <a:effectRef idx="1">
+              <a:schemeClr val="accent4"/>
+            </a:effectRef>
+            <a:fontRef idx="minor">
+              <a:schemeClr val="dk1"/>
+            </a:fontRef>
+          </p:style>
+          <p:txBody>
+            <a:bodyPr rtlCol="0" anchor="ctr"/>
+            <a:lstStyle/>
+            <a:p>
+              <a:pPr algn="ctr"/>
+              <a:r>
+                <a:rPr lang="es-AR" dirty="0" err="1" smtClean="0"/>
+                <a:t>Model</a:t>
+              </a:r>
+              <a:endParaRPr lang="es-AR" dirty="0"/>
+            </a:p>
+          </p:txBody>
+        </p:sp>
+      </p:grpSp>
     </p:spTree>
     <p:extLst>
       <p:ext uri="{BB962C8B-B14F-4D97-AF65-F5344CB8AC3E}">
-        <p14:creationId xmlns:p14="http://schemas.microsoft.com/office/powerpoint/2010/main" val="1930479364"/>
+        <p14:creationId xmlns:p14="http://schemas.microsoft.com/office/powerpoint/2010/main" val="3845624738"/>
       </p:ext>
     </p:extLst>
   </p:cSld>
@@ -8847,15 +9908,7 @@
           <a:p>
             <a:r>
               <a:rPr lang="en-US" dirty="0" err="1" smtClean="0"/>
-              <a:t>Escalabilidad</a:t>
-            </a:r>
-            <a:r>
-              <a:rPr lang="en-US" dirty="0" smtClean="0"/>
-              <a:t> a </a:t>
-            </a:r>
-            <a:r>
-              <a:rPr lang="en-US" dirty="0" err="1" smtClean="0"/>
-              <a:t>Futuro</a:t>
+              <a:t>Infraestructura</a:t>
             </a:r>
             <a:endParaRPr lang="es-AR" dirty="0"/>
           </a:p>
@@ -8878,15 +9931,46 @@
           </a:bodyPr>
           <a:lstStyle/>
           <a:p>
+            <a:pPr marL="0" indent="0">
+              <a:buNone/>
+            </a:pPr>
+            <a:r>
+              <a:rPr lang="en-US" sz="3600" dirty="0" smtClean="0"/>
+              <a:t>Windows Azure</a:t>
+            </a:r>
+          </a:p>
+          <a:p>
             <a:r>
               <a:rPr lang="en-US" sz="2800" dirty="0" smtClean="0"/>
-              <a:t>Caching</a:t>
+              <a:t>Azure Web Sites </a:t>
             </a:r>
           </a:p>
           <a:p>
             <a:r>
               <a:rPr lang="en-US" sz="2800" dirty="0" smtClean="0"/>
-              <a:t>Base de </a:t>
+              <a:t>Azure Storage Blobs (</a:t>
+            </a:r>
+            <a:r>
+              <a:rPr lang="en-US" sz="2800" dirty="0" err="1" smtClean="0"/>
+              <a:t>fotos</a:t>
+            </a:r>
+            <a:r>
+              <a:rPr lang="en-US" sz="2800" dirty="0" smtClean="0"/>
+              <a:t>)</a:t>
+            </a:r>
+          </a:p>
+          <a:p>
+            <a:r>
+              <a:rPr lang="en-US" sz="2800" dirty="0" smtClean="0"/>
+              <a:t>SQL Azure (</a:t>
+            </a:r>
+            <a:r>
+              <a:rPr lang="en-US" sz="2800" dirty="0" err="1" smtClean="0"/>
+              <a:t>demás</a:t>
+            </a:r>
+            <a:r>
+              <a:rPr lang="en-US" sz="2800" dirty="0" smtClean="0"/>
+              <a:t> </a:t>
             </a:r>
             <a:r>
               <a:rPr lang="en-US" sz="2800" dirty="0" err="1" smtClean="0"/>
@@ -8894,58 +9978,57 @@
             </a:r>
             <a:r>
               <a:rPr lang="en-US" sz="2800" dirty="0" smtClean="0"/>
-              <a:t> con clustering </a:t>
-            </a:r>
+              <a:t>)</a:t>
+            </a:r>
+          </a:p>
+          <a:p>
+            <a:pPr marL="0" indent="0">
+              <a:buNone/>
+            </a:pPr>
+            <a:r>
+              <a:rPr lang="en-US" sz="3600" dirty="0" err="1" smtClean="0"/>
+              <a:t>Beneficios</a:t>
+            </a:r>
+            <a:endParaRPr lang="en-US" sz="3600" dirty="0" smtClean="0"/>
           </a:p>
           <a:p>
             <a:r>
               <a:rPr lang="en-US" sz="2800" dirty="0" err="1" smtClean="0"/>
-              <a:t>Múltiples</a:t>
+              <a:t>Escalabilidad</a:t>
             </a:r>
             <a:r>
               <a:rPr lang="en-US" sz="2800" dirty="0" smtClean="0"/>
-              <a:t> </a:t>
+              <a:t> on-demand</a:t>
+            </a:r>
+          </a:p>
+          <a:p>
+            <a:r>
+              <a:rPr lang="en-US" sz="2800" dirty="0" smtClean="0"/>
+              <a:t>Load-balancing</a:t>
+            </a:r>
+          </a:p>
+          <a:p>
+            <a:r>
+              <a:rPr lang="en-US" sz="2800" dirty="0" smtClean="0"/>
+              <a:t>CDN</a:t>
+            </a:r>
+          </a:p>
+          <a:p>
+            <a:r>
+              <a:rPr lang="en-US" sz="2800" dirty="0" smtClean="0"/>
+              <a:t>No </a:t>
             </a:r>
             <a:r>
               <a:rPr lang="en-US" sz="2800" dirty="0" err="1" smtClean="0"/>
-              <a:t>servidores</a:t>
-            </a:r>
-            <a:endParaRPr lang="en-US" sz="2800" dirty="0" smtClean="0"/>
-          </a:p>
-          <a:p>
-            <a:r>
-              <a:rPr lang="en-US" sz="2800" dirty="0"/>
-              <a:t>Balance de </a:t>
+              <a:t>necesita</a:t>
+            </a:r>
+            <a:r>
+              <a:rPr lang="en-US" sz="2800" dirty="0" smtClean="0"/>
+              <a:t> personal IT </a:t>
             </a:r>
             <a:r>
               <a:rPr lang="en-US" sz="2800" dirty="0" err="1" smtClean="0"/>
-              <a:t>carga</a:t>
-            </a:r>
-            <a:endParaRPr lang="en-US" sz="2800" dirty="0"/>
-          </a:p>
-          <a:p>
-            <a:r>
-              <a:rPr lang="en-US" sz="2800" dirty="0" smtClean="0"/>
-              <a:t>HTTP batched responses para </a:t>
-            </a:r>
-            <a:r>
-              <a:rPr lang="en-US" sz="2800" dirty="0" err="1" smtClean="0"/>
-              <a:t>mapas</a:t>
-            </a:r>
-            <a:endParaRPr lang="en-US" sz="2800" dirty="0" smtClean="0"/>
-          </a:p>
-          <a:p>
-            <a:r>
-              <a:rPr lang="en-US" sz="2800" dirty="0" err="1" smtClean="0"/>
-              <a:t>Confirmación</a:t>
-            </a:r>
-            <a:r>
-              <a:rPr lang="en-US" sz="2800" dirty="0" smtClean="0"/>
-              <a:t> </a:t>
-            </a:r>
-            <a:r>
-              <a:rPr lang="en-US" sz="2800" dirty="0" err="1" smtClean="0"/>
-              <a:t>usuarios</a:t>
+              <a:t>dedicado</a:t>
             </a:r>
             <a:endParaRPr lang="es-AR" sz="2800" dirty="0"/>
           </a:p>
@@ -8954,7 +10037,7 @@
     </p:spTree>
     <p:extLst>
       <p:ext uri="{BB962C8B-B14F-4D97-AF65-F5344CB8AC3E}">
-        <p14:creationId xmlns:p14="http://schemas.microsoft.com/office/powerpoint/2010/main" val="4046548601"/>
+        <p14:creationId xmlns:p14="http://schemas.microsoft.com/office/powerpoint/2010/main" val="1268582405"/>
       </p:ext>
     </p:extLst>
   </p:cSld>

</xml_diff>